<commit_message>
Marketing master Plan updated for Website Epics, Effectiveness, Marketing artwork plan
Marketing master Plan updated for Website Epics, Effectiveness, Marketing artwork plan
</commit_message>
<xml_diff>
--- a/Offline/FacultyK12.pptx
+++ b/Offline/FacultyK12.pptx
@@ -6,7 +6,8 @@
   </p:sldMasterIdLst>
   <p:sldIdLst>
     <p:sldId id="256" r:id="rId2"/>
-    <p:sldId id="257" r:id="rId3"/>
+    <p:sldId id="258" r:id="rId3"/>
+    <p:sldId id="257" r:id="rId4"/>
   </p:sldIdLst>
   <p:sldSz cx="12192000" cy="6858000"/>
   <p:notesSz cx="6858000" cy="9144000"/>
@@ -105,6 +106,11 @@
       </a:defRPr>
     </a:lvl9pPr>
   </p:defaultTextStyle>
+  <p:extLst>
+    <p:ext uri="{EFAFB233-063F-42B5-8137-9DF3F51BA10A}">
+      <p15:sldGuideLst xmlns:p15="http://schemas.microsoft.com/office/powerpoint/2012/main"/>
+    </p:ext>
+  </p:extLst>
 </p:presentation>
 </file>
 
@@ -257,7 +263,7 @@
           <a:p>
             <a:fld id="{AA2E88B2-348B-418F-A511-26A789EEB289}" type="datetimeFigureOut">
               <a:rPr lang="en-AU" smtClean="0"/>
-              <a:t>1/05/2023</a:t>
+              <a:t>3/05/2023</a:t>
             </a:fld>
             <a:endParaRPr lang="en-AU"/>
           </a:p>
@@ -457,7 +463,7 @@
           <a:p>
             <a:fld id="{AA2E88B2-348B-418F-A511-26A789EEB289}" type="datetimeFigureOut">
               <a:rPr lang="en-AU" smtClean="0"/>
-              <a:t>1/05/2023</a:t>
+              <a:t>3/05/2023</a:t>
             </a:fld>
             <a:endParaRPr lang="en-AU"/>
           </a:p>
@@ -667,7 +673,7 @@
           <a:p>
             <a:fld id="{AA2E88B2-348B-418F-A511-26A789EEB289}" type="datetimeFigureOut">
               <a:rPr lang="en-AU" smtClean="0"/>
-              <a:t>1/05/2023</a:t>
+              <a:t>3/05/2023</a:t>
             </a:fld>
             <a:endParaRPr lang="en-AU"/>
           </a:p>
@@ -867,7 +873,7 @@
           <a:p>
             <a:fld id="{AA2E88B2-348B-418F-A511-26A789EEB289}" type="datetimeFigureOut">
               <a:rPr lang="en-AU" smtClean="0"/>
-              <a:t>1/05/2023</a:t>
+              <a:t>3/05/2023</a:t>
             </a:fld>
             <a:endParaRPr lang="en-AU"/>
           </a:p>
@@ -1143,7 +1149,7 @@
           <a:p>
             <a:fld id="{AA2E88B2-348B-418F-A511-26A789EEB289}" type="datetimeFigureOut">
               <a:rPr lang="en-AU" smtClean="0"/>
-              <a:t>1/05/2023</a:t>
+              <a:t>3/05/2023</a:t>
             </a:fld>
             <a:endParaRPr lang="en-AU"/>
           </a:p>
@@ -1411,7 +1417,7 @@
           <a:p>
             <a:fld id="{AA2E88B2-348B-418F-A511-26A789EEB289}" type="datetimeFigureOut">
               <a:rPr lang="en-AU" smtClean="0"/>
-              <a:t>1/05/2023</a:t>
+              <a:t>3/05/2023</a:t>
             </a:fld>
             <a:endParaRPr lang="en-AU"/>
           </a:p>
@@ -1826,7 +1832,7 @@
           <a:p>
             <a:fld id="{AA2E88B2-348B-418F-A511-26A789EEB289}" type="datetimeFigureOut">
               <a:rPr lang="en-AU" smtClean="0"/>
-              <a:t>1/05/2023</a:t>
+              <a:t>3/05/2023</a:t>
             </a:fld>
             <a:endParaRPr lang="en-AU"/>
           </a:p>
@@ -1968,7 +1974,7 @@
           <a:p>
             <a:fld id="{AA2E88B2-348B-418F-A511-26A789EEB289}" type="datetimeFigureOut">
               <a:rPr lang="en-AU" smtClean="0"/>
-              <a:t>1/05/2023</a:t>
+              <a:t>3/05/2023</a:t>
             </a:fld>
             <a:endParaRPr lang="en-AU"/>
           </a:p>
@@ -2081,7 +2087,7 @@
           <a:p>
             <a:fld id="{AA2E88B2-348B-418F-A511-26A789EEB289}" type="datetimeFigureOut">
               <a:rPr lang="en-AU" smtClean="0"/>
-              <a:t>1/05/2023</a:t>
+              <a:t>3/05/2023</a:t>
             </a:fld>
             <a:endParaRPr lang="en-AU"/>
           </a:p>
@@ -2394,7 +2400,7 @@
           <a:p>
             <a:fld id="{AA2E88B2-348B-418F-A511-26A789EEB289}" type="datetimeFigureOut">
               <a:rPr lang="en-AU" smtClean="0"/>
-              <a:t>1/05/2023</a:t>
+              <a:t>3/05/2023</a:t>
             </a:fld>
             <a:endParaRPr lang="en-AU"/>
           </a:p>
@@ -2683,7 +2689,7 @@
           <a:p>
             <a:fld id="{AA2E88B2-348B-418F-A511-26A789EEB289}" type="datetimeFigureOut">
               <a:rPr lang="en-AU" smtClean="0"/>
-              <a:t>1/05/2023</a:t>
+              <a:t>3/05/2023</a:t>
             </a:fld>
             <a:endParaRPr lang="en-AU"/>
           </a:p>
@@ -2926,7 +2932,7 @@
           <a:p>
             <a:fld id="{AA2E88B2-348B-418F-A511-26A789EEB289}" type="datetimeFigureOut">
               <a:rPr lang="en-AU" smtClean="0"/>
-              <a:t>1/05/2023</a:t>
+              <a:t>3/05/2023</a:t>
             </a:fld>
             <a:endParaRPr lang="en-AU"/>
           </a:p>
@@ -3327,6 +3333,1961 @@
 </file>
 
 <file path=ppt/slides/slide1.xml><?xml version="1.0" encoding="utf-8"?>
+<p:sld xmlns:a="http://schemas.openxmlformats.org/drawingml/2006/main" xmlns:r="http://schemas.openxmlformats.org/officeDocument/2006/relationships" xmlns:p="http://schemas.openxmlformats.org/presentationml/2006/main">
+  <p:cSld>
+    <p:spTree>
+      <p:nvGrpSpPr>
+        <p:cNvPr id="1" name=""/>
+        <p:cNvGrpSpPr/>
+        <p:nvPr/>
+      </p:nvGrpSpPr>
+      <p:grpSpPr>
+        <a:xfrm>
+          <a:off x="0" y="0"/>
+          <a:ext cx="0" cy="0"/>
+          <a:chOff x="0" y="0"/>
+          <a:chExt cx="0" cy="0"/>
+        </a:xfrm>
+      </p:grpSpPr>
+      <p:sp>
+        <p:nvSpPr>
+          <p:cNvPr id="4" name="Rounded Rectangle 32">
+            <a:extLst>
+              <a:ext uri="{FF2B5EF4-FFF2-40B4-BE49-F238E27FC236}">
+                <a16:creationId xmlns:a16="http://schemas.microsoft.com/office/drawing/2014/main" id="{DDB5EBE6-DC83-4C22-A245-44C7445E9AF2}"/>
+              </a:ext>
+            </a:extLst>
+          </p:cNvPr>
+          <p:cNvSpPr/>
+          <p:nvPr/>
+        </p:nvSpPr>
+        <p:spPr>
+          <a:xfrm>
+            <a:off x="4033226" y="1925497"/>
+            <a:ext cx="2932935" cy="3152535"/>
+          </a:xfrm>
+          <a:prstGeom prst="roundRect">
+            <a:avLst>
+              <a:gd name="adj" fmla="val 9399"/>
+            </a:avLst>
+          </a:prstGeom>
+          <a:solidFill>
+            <a:schemeClr val="bg1">
+              <a:lumMod val="95000"/>
+            </a:schemeClr>
+          </a:solidFill>
+          <a:ln>
+            <a:noFill/>
+          </a:ln>
+        </p:spPr>
+        <p:style>
+          <a:lnRef idx="2">
+            <a:schemeClr val="accent1">
+              <a:shade val="50000"/>
+            </a:schemeClr>
+          </a:lnRef>
+          <a:fillRef idx="1">
+            <a:schemeClr val="accent1"/>
+          </a:fillRef>
+          <a:effectRef idx="0">
+            <a:schemeClr val="accent1"/>
+          </a:effectRef>
+          <a:fontRef idx="minor">
+            <a:schemeClr val="lt1"/>
+          </a:fontRef>
+        </p:style>
+        <p:txBody>
+          <a:bodyPr rtlCol="0" anchor="ctr"/>
+          <a:lstStyle/>
+          <a:p>
+            <a:pPr algn="ctr"/>
+            <a:endParaRPr lang="en-AU">
+              <a:latin typeface="Oxygen" panose="02000503000000000000" pitchFamily="2" charset="0"/>
+            </a:endParaRPr>
+          </a:p>
+        </p:txBody>
+      </p:sp>
+      <p:sp>
+        <p:nvSpPr>
+          <p:cNvPr id="5" name="Rectangle 4">
+            <a:extLst>
+              <a:ext uri="{FF2B5EF4-FFF2-40B4-BE49-F238E27FC236}">
+                <a16:creationId xmlns:a16="http://schemas.microsoft.com/office/drawing/2014/main" id="{9FB063F2-3DF0-4B92-B14A-3BEA0C2087FD}"/>
+              </a:ext>
+            </a:extLst>
+          </p:cNvPr>
+          <p:cNvSpPr/>
+          <p:nvPr/>
+        </p:nvSpPr>
+        <p:spPr>
+          <a:xfrm>
+            <a:off x="3824629" y="381242"/>
+            <a:ext cx="75415" cy="6476761"/>
+          </a:xfrm>
+          <a:prstGeom prst="rect">
+            <a:avLst/>
+          </a:prstGeom>
+          <a:gradFill>
+            <a:gsLst>
+              <a:gs pos="0">
+                <a:schemeClr val="bg1"/>
+              </a:gs>
+              <a:gs pos="60000">
+                <a:srgbClr val="FF8C52"/>
+              </a:gs>
+              <a:gs pos="40000">
+                <a:srgbClr val="FF8C52"/>
+              </a:gs>
+              <a:gs pos="20000">
+                <a:schemeClr val="bg1"/>
+              </a:gs>
+              <a:gs pos="80000">
+                <a:schemeClr val="bg1"/>
+              </a:gs>
+              <a:gs pos="100000">
+                <a:schemeClr val="bg1"/>
+              </a:gs>
+            </a:gsLst>
+            <a:lin ang="5400000" scaled="1"/>
+          </a:gradFill>
+          <a:ln>
+            <a:noFill/>
+          </a:ln>
+        </p:spPr>
+        <p:style>
+          <a:lnRef idx="2">
+            <a:schemeClr val="accent1">
+              <a:shade val="50000"/>
+            </a:schemeClr>
+          </a:lnRef>
+          <a:fillRef idx="1">
+            <a:schemeClr val="accent1"/>
+          </a:fillRef>
+          <a:effectRef idx="0">
+            <a:schemeClr val="accent1"/>
+          </a:effectRef>
+          <a:fontRef idx="minor">
+            <a:schemeClr val="lt1"/>
+          </a:fontRef>
+        </p:style>
+        <p:txBody>
+          <a:bodyPr rtlCol="0" anchor="ctr"/>
+          <a:lstStyle/>
+          <a:p>
+            <a:pPr algn="ctr"/>
+            <a:endParaRPr lang="en-AU">
+              <a:latin typeface="Oxygen" panose="02000503000000000000" pitchFamily="2" charset="0"/>
+            </a:endParaRPr>
+          </a:p>
+        </p:txBody>
+      </p:sp>
+      <p:sp>
+        <p:nvSpPr>
+          <p:cNvPr id="6" name="Rectangle 5">
+            <a:extLst>
+              <a:ext uri="{FF2B5EF4-FFF2-40B4-BE49-F238E27FC236}">
+                <a16:creationId xmlns:a16="http://schemas.microsoft.com/office/drawing/2014/main" id="{55D21A43-7369-49B0-A177-575F11A00F48}"/>
+              </a:ext>
+            </a:extLst>
+          </p:cNvPr>
+          <p:cNvSpPr/>
+          <p:nvPr/>
+        </p:nvSpPr>
+        <p:spPr>
+          <a:xfrm>
+            <a:off x="3824624" y="5691"/>
+            <a:ext cx="8367376" cy="770637"/>
+          </a:xfrm>
+          <a:prstGeom prst="rect">
+            <a:avLst/>
+          </a:prstGeom>
+          <a:solidFill>
+            <a:schemeClr val="bg1">
+              <a:lumMod val="95000"/>
+            </a:schemeClr>
+          </a:solidFill>
+          <a:ln>
+            <a:noFill/>
+          </a:ln>
+        </p:spPr>
+        <p:style>
+          <a:lnRef idx="2">
+            <a:schemeClr val="accent1">
+              <a:shade val="50000"/>
+            </a:schemeClr>
+          </a:lnRef>
+          <a:fillRef idx="1">
+            <a:schemeClr val="accent1"/>
+          </a:fillRef>
+          <a:effectRef idx="0">
+            <a:schemeClr val="accent1"/>
+          </a:effectRef>
+          <a:fontRef idx="minor">
+            <a:schemeClr val="lt1"/>
+          </a:fontRef>
+        </p:style>
+        <p:txBody>
+          <a:bodyPr rtlCol="0" anchor="ctr"/>
+          <a:lstStyle/>
+          <a:p>
+            <a:endParaRPr lang="en-AU" sz="800" dirty="0">
+              <a:solidFill>
+                <a:schemeClr val="bg1">
+                  <a:lumMod val="50000"/>
+                </a:schemeClr>
+              </a:solidFill>
+              <a:latin typeface="Oxygen" panose="02000503000000000000" pitchFamily="2" charset="0"/>
+            </a:endParaRPr>
+          </a:p>
+        </p:txBody>
+      </p:sp>
+      <p:pic>
+        <p:nvPicPr>
+          <p:cNvPr id="17" name="Picture 16">
+            <a:extLst>
+              <a:ext uri="{FF2B5EF4-FFF2-40B4-BE49-F238E27FC236}">
+                <a16:creationId xmlns:a16="http://schemas.microsoft.com/office/drawing/2014/main" id="{86616FCF-658A-46B8-8458-6B3E12305DAC}"/>
+              </a:ext>
+            </a:extLst>
+          </p:cNvPr>
+          <p:cNvPicPr>
+            <a:picLocks noChangeAspect="1"/>
+          </p:cNvPicPr>
+          <p:nvPr/>
+        </p:nvPicPr>
+        <p:blipFill>
+          <a:blip r:embed="rId2"/>
+          <a:stretch>
+            <a:fillRect/>
+          </a:stretch>
+        </p:blipFill>
+        <p:spPr>
+          <a:xfrm>
+            <a:off x="687804" y="381238"/>
+            <a:ext cx="2471777" cy="921014"/>
+          </a:xfrm>
+          <a:prstGeom prst="rect">
+            <a:avLst/>
+          </a:prstGeom>
+        </p:spPr>
+      </p:pic>
+      <p:sp>
+        <p:nvSpPr>
+          <p:cNvPr id="18" name="Freeform 22">
+            <a:extLst>
+              <a:ext uri="{FF2B5EF4-FFF2-40B4-BE49-F238E27FC236}">
+                <a16:creationId xmlns:a16="http://schemas.microsoft.com/office/drawing/2014/main" id="{E342C9F1-212F-4C96-A051-F2F4224CB3DC}"/>
+              </a:ext>
+            </a:extLst>
+          </p:cNvPr>
+          <p:cNvSpPr/>
+          <p:nvPr/>
+        </p:nvSpPr>
+        <p:spPr>
+          <a:xfrm>
+            <a:off x="802505" y="156881"/>
+            <a:ext cx="802950" cy="802951"/>
+          </a:xfrm>
+          <a:custGeom>
+            <a:avLst/>
+            <a:gdLst>
+              <a:gd name="connsiteX0" fmla="*/ 1080000 w 2160000"/>
+              <a:gd name="connsiteY0" fmla="*/ 0 h 2160000"/>
+              <a:gd name="connsiteX1" fmla="*/ 2154424 w 2160000"/>
+              <a:gd name="connsiteY1" fmla="*/ 969576 h 2160000"/>
+              <a:gd name="connsiteX2" fmla="*/ 2157027 w 2160000"/>
+              <a:gd name="connsiteY2" fmla="*/ 1021127 h 2160000"/>
+              <a:gd name="connsiteX3" fmla="*/ 2159999 w 2160000"/>
+              <a:gd name="connsiteY3" fmla="*/ 1021127 h 2160000"/>
+              <a:gd name="connsiteX4" fmla="*/ 2159999 w 2160000"/>
+              <a:gd name="connsiteY4" fmla="*/ 1079980 h 2160000"/>
+              <a:gd name="connsiteX5" fmla="*/ 2160000 w 2160000"/>
+              <a:gd name="connsiteY5" fmla="*/ 1080000 h 2160000"/>
+              <a:gd name="connsiteX6" fmla="*/ 2159999 w 2160000"/>
+              <a:gd name="connsiteY6" fmla="*/ 1080021 h 2160000"/>
+              <a:gd name="connsiteX7" fmla="*/ 2159999 w 2160000"/>
+              <a:gd name="connsiteY7" fmla="*/ 1716639 h 2160000"/>
+              <a:gd name="connsiteX8" fmla="*/ 2157838 w 2160000"/>
+              <a:gd name="connsiteY8" fmla="*/ 1716639 h 2160000"/>
+              <a:gd name="connsiteX9" fmla="*/ 2160000 w 2160000"/>
+              <a:gd name="connsiteY9" fmla="*/ 1738544 h 2160000"/>
+              <a:gd name="connsiteX10" fmla="*/ 1891921 w 2160000"/>
+              <a:gd name="connsiteY10" fmla="*/ 2012333 h 2160000"/>
+              <a:gd name="connsiteX11" fmla="*/ 1623842 w 2160000"/>
+              <a:gd name="connsiteY11" fmla="*/ 1738544 h 2160000"/>
+              <a:gd name="connsiteX12" fmla="*/ 1626005 w 2160000"/>
+              <a:gd name="connsiteY12" fmla="*/ 1716639 h 2160000"/>
+              <a:gd name="connsiteX13" fmla="*/ 1620298 w 2160000"/>
+              <a:gd name="connsiteY13" fmla="*/ 1716639 h 2160000"/>
+              <a:gd name="connsiteX14" fmla="*/ 1620298 w 2160000"/>
+              <a:gd name="connsiteY14" fmla="*/ 1090950 h 2160000"/>
+              <a:gd name="connsiteX15" fmla="*/ 1618898 w 2160000"/>
+              <a:gd name="connsiteY15" fmla="*/ 1090937 h 2160000"/>
+              <a:gd name="connsiteX16" fmla="*/ 1620000 w 2160000"/>
+              <a:gd name="connsiteY16" fmla="*/ 1080000 h 2160000"/>
+              <a:gd name="connsiteX17" fmla="*/ 1080000 w 2160000"/>
+              <a:gd name="connsiteY17" fmla="*/ 540000 h 2160000"/>
+              <a:gd name="connsiteX18" fmla="*/ 540000 w 2160000"/>
+              <a:gd name="connsiteY18" fmla="*/ 1080000 h 2160000"/>
+              <a:gd name="connsiteX19" fmla="*/ 1080000 w 2160000"/>
+              <a:gd name="connsiteY19" fmla="*/ 1620000 h 2160000"/>
+              <a:gd name="connsiteX20" fmla="*/ 1172144 w 2160000"/>
+              <a:gd name="connsiteY20" fmla="*/ 1610711 h 2160000"/>
+              <a:gd name="connsiteX21" fmla="*/ 1192722 w 2160000"/>
+              <a:gd name="connsiteY21" fmla="*/ 1599542 h 2160000"/>
+              <a:gd name="connsiteX22" fmla="*/ 1205334 w 2160000"/>
+              <a:gd name="connsiteY22" fmla="*/ 1595627 h 2160000"/>
+              <a:gd name="connsiteX23" fmla="*/ 1218649 w 2160000"/>
+              <a:gd name="connsiteY23" fmla="*/ 1594482 h 2160000"/>
+              <a:gd name="connsiteX24" fmla="*/ 1273176 w 2160000"/>
+              <a:gd name="connsiteY24" fmla="*/ 1581875 h 2160000"/>
+              <a:gd name="connsiteX25" fmla="*/ 1277433 w 2160000"/>
+              <a:gd name="connsiteY25" fmla="*/ 1580379 h 2160000"/>
+              <a:gd name="connsiteX26" fmla="*/ 1297818 w 2160000"/>
+              <a:gd name="connsiteY26" fmla="*/ 1578324 h 2160000"/>
+              <a:gd name="connsiteX27" fmla="*/ 1567818 w 2160000"/>
+              <a:gd name="connsiteY27" fmla="*/ 1848324 h 2160000"/>
+              <a:gd name="connsiteX28" fmla="*/ 1469563 w 2160000"/>
+              <a:gd name="connsiteY28" fmla="*/ 2056669 h 2160000"/>
+              <a:gd name="connsiteX29" fmla="*/ 1412948 w 2160000"/>
+              <a:gd name="connsiteY29" fmla="*/ 2091019 h 2160000"/>
+              <a:gd name="connsiteX30" fmla="*/ 1398272 w 2160000"/>
+              <a:gd name="connsiteY30" fmla="*/ 2101498 h 2160000"/>
+              <a:gd name="connsiteX31" fmla="*/ 1374464 w 2160000"/>
+              <a:gd name="connsiteY31" fmla="*/ 2110955 h 2160000"/>
+              <a:gd name="connsiteX32" fmla="*/ 1376211 w 2160000"/>
+              <a:gd name="connsiteY32" fmla="*/ 2117860 h 2160000"/>
+              <a:gd name="connsiteX33" fmla="*/ 1321962 w 2160000"/>
+              <a:gd name="connsiteY33" fmla="*/ 2131809 h 2160000"/>
+              <a:gd name="connsiteX34" fmla="*/ 1306247 w 2160000"/>
+              <a:gd name="connsiteY34" fmla="*/ 2138051 h 2160000"/>
+              <a:gd name="connsiteX35" fmla="*/ 1267530 w 2160000"/>
+              <a:gd name="connsiteY35" fmla="*/ 2142656 h 2160000"/>
+              <a:gd name="connsiteX36" fmla="*/ 1190424 w 2160000"/>
+              <a:gd name="connsiteY36" fmla="*/ 2154424 h 2160000"/>
+              <a:gd name="connsiteX37" fmla="*/ 1080000 w 2160000"/>
+              <a:gd name="connsiteY37" fmla="*/ 2160000 h 2160000"/>
+              <a:gd name="connsiteX38" fmla="*/ 0 w 2160000"/>
+              <a:gd name="connsiteY38" fmla="*/ 1080000 h 2160000"/>
+              <a:gd name="connsiteX39" fmla="*/ 1080000 w 2160000"/>
+              <a:gd name="connsiteY39" fmla="*/ 0 h 2160000"/>
+            </a:gdLst>
+            <a:ahLst/>
+            <a:cxnLst>
+              <a:cxn ang="0">
+                <a:pos x="connsiteX0" y="connsiteY0"/>
+              </a:cxn>
+              <a:cxn ang="0">
+                <a:pos x="connsiteX1" y="connsiteY1"/>
+              </a:cxn>
+              <a:cxn ang="0">
+                <a:pos x="connsiteX2" y="connsiteY2"/>
+              </a:cxn>
+              <a:cxn ang="0">
+                <a:pos x="connsiteX3" y="connsiteY3"/>
+              </a:cxn>
+              <a:cxn ang="0">
+                <a:pos x="connsiteX4" y="connsiteY4"/>
+              </a:cxn>
+              <a:cxn ang="0">
+                <a:pos x="connsiteX5" y="connsiteY5"/>
+              </a:cxn>
+              <a:cxn ang="0">
+                <a:pos x="connsiteX6" y="connsiteY6"/>
+              </a:cxn>
+              <a:cxn ang="0">
+                <a:pos x="connsiteX7" y="connsiteY7"/>
+              </a:cxn>
+              <a:cxn ang="0">
+                <a:pos x="connsiteX8" y="connsiteY8"/>
+              </a:cxn>
+              <a:cxn ang="0">
+                <a:pos x="connsiteX9" y="connsiteY9"/>
+              </a:cxn>
+              <a:cxn ang="0">
+                <a:pos x="connsiteX10" y="connsiteY10"/>
+              </a:cxn>
+              <a:cxn ang="0">
+                <a:pos x="connsiteX11" y="connsiteY11"/>
+              </a:cxn>
+              <a:cxn ang="0">
+                <a:pos x="connsiteX12" y="connsiteY12"/>
+              </a:cxn>
+              <a:cxn ang="0">
+                <a:pos x="connsiteX13" y="connsiteY13"/>
+              </a:cxn>
+              <a:cxn ang="0">
+                <a:pos x="connsiteX14" y="connsiteY14"/>
+              </a:cxn>
+              <a:cxn ang="0">
+                <a:pos x="connsiteX15" y="connsiteY15"/>
+              </a:cxn>
+              <a:cxn ang="0">
+                <a:pos x="connsiteX16" y="connsiteY16"/>
+              </a:cxn>
+              <a:cxn ang="0">
+                <a:pos x="connsiteX17" y="connsiteY17"/>
+              </a:cxn>
+              <a:cxn ang="0">
+                <a:pos x="connsiteX18" y="connsiteY18"/>
+              </a:cxn>
+              <a:cxn ang="0">
+                <a:pos x="connsiteX19" y="connsiteY19"/>
+              </a:cxn>
+              <a:cxn ang="0">
+                <a:pos x="connsiteX20" y="connsiteY20"/>
+              </a:cxn>
+              <a:cxn ang="0">
+                <a:pos x="connsiteX21" y="connsiteY21"/>
+              </a:cxn>
+              <a:cxn ang="0">
+                <a:pos x="connsiteX22" y="connsiteY22"/>
+              </a:cxn>
+              <a:cxn ang="0">
+                <a:pos x="connsiteX23" y="connsiteY23"/>
+              </a:cxn>
+              <a:cxn ang="0">
+                <a:pos x="connsiteX24" y="connsiteY24"/>
+              </a:cxn>
+              <a:cxn ang="0">
+                <a:pos x="connsiteX25" y="connsiteY25"/>
+              </a:cxn>
+              <a:cxn ang="0">
+                <a:pos x="connsiteX26" y="connsiteY26"/>
+              </a:cxn>
+              <a:cxn ang="0">
+                <a:pos x="connsiteX27" y="connsiteY27"/>
+              </a:cxn>
+              <a:cxn ang="0">
+                <a:pos x="connsiteX28" y="connsiteY28"/>
+              </a:cxn>
+              <a:cxn ang="0">
+                <a:pos x="connsiteX29" y="connsiteY29"/>
+              </a:cxn>
+              <a:cxn ang="0">
+                <a:pos x="connsiteX30" y="connsiteY30"/>
+              </a:cxn>
+              <a:cxn ang="0">
+                <a:pos x="connsiteX31" y="connsiteY31"/>
+              </a:cxn>
+              <a:cxn ang="0">
+                <a:pos x="connsiteX32" y="connsiteY32"/>
+              </a:cxn>
+              <a:cxn ang="0">
+                <a:pos x="connsiteX33" y="connsiteY33"/>
+              </a:cxn>
+              <a:cxn ang="0">
+                <a:pos x="connsiteX34" y="connsiteY34"/>
+              </a:cxn>
+              <a:cxn ang="0">
+                <a:pos x="connsiteX35" y="connsiteY35"/>
+              </a:cxn>
+              <a:cxn ang="0">
+                <a:pos x="connsiteX36" y="connsiteY36"/>
+              </a:cxn>
+              <a:cxn ang="0">
+                <a:pos x="connsiteX37" y="connsiteY37"/>
+              </a:cxn>
+              <a:cxn ang="0">
+                <a:pos x="connsiteX38" y="connsiteY38"/>
+              </a:cxn>
+              <a:cxn ang="0">
+                <a:pos x="connsiteX39" y="connsiteY39"/>
+              </a:cxn>
+            </a:cxnLst>
+            <a:rect l="l" t="t" r="r" b="b"/>
+            <a:pathLst>
+              <a:path w="2160000" h="2160000">
+                <a:moveTo>
+                  <a:pt x="1080000" y="0"/>
+                </a:moveTo>
+                <a:cubicBezTo>
+                  <a:pt x="1639189" y="0"/>
+                  <a:pt x="2099117" y="424979"/>
+                  <a:pt x="2154424" y="969576"/>
+                </a:cubicBezTo>
+                <a:lnTo>
+                  <a:pt x="2157027" y="1021127"/>
+                </a:lnTo>
+                <a:lnTo>
+                  <a:pt x="2159999" y="1021127"/>
+                </a:lnTo>
+                <a:lnTo>
+                  <a:pt x="2159999" y="1079980"/>
+                </a:lnTo>
+                <a:lnTo>
+                  <a:pt x="2160000" y="1080000"/>
+                </a:lnTo>
+                <a:lnTo>
+                  <a:pt x="2159999" y="1080021"/>
+                </a:lnTo>
+                <a:lnTo>
+                  <a:pt x="2159999" y="1716639"/>
+                </a:lnTo>
+                <a:lnTo>
+                  <a:pt x="2157838" y="1716639"/>
+                </a:lnTo>
+                <a:lnTo>
+                  <a:pt x="2160000" y="1738544"/>
+                </a:lnTo>
+                <a:cubicBezTo>
+                  <a:pt x="2160000" y="1889753"/>
+                  <a:pt x="2039977" y="2012333"/>
+                  <a:pt x="1891921" y="2012333"/>
+                </a:cubicBezTo>
+                <a:cubicBezTo>
+                  <a:pt x="1743865" y="2012333"/>
+                  <a:pt x="1623842" y="1889753"/>
+                  <a:pt x="1623842" y="1738544"/>
+                </a:cubicBezTo>
+                <a:lnTo>
+                  <a:pt x="1626005" y="1716639"/>
+                </a:lnTo>
+                <a:lnTo>
+                  <a:pt x="1620298" y="1716639"/>
+                </a:lnTo>
+                <a:lnTo>
+                  <a:pt x="1620298" y="1090950"/>
+                </a:lnTo>
+                <a:lnTo>
+                  <a:pt x="1618898" y="1090937"/>
+                </a:lnTo>
+                <a:lnTo>
+                  <a:pt x="1620000" y="1080000"/>
+                </a:lnTo>
+                <a:cubicBezTo>
+                  <a:pt x="1620000" y="781766"/>
+                  <a:pt x="1378234" y="540000"/>
+                  <a:pt x="1080000" y="540000"/>
+                </a:cubicBezTo>
+                <a:cubicBezTo>
+                  <a:pt x="781766" y="540000"/>
+                  <a:pt x="540000" y="781766"/>
+                  <a:pt x="540000" y="1080000"/>
+                </a:cubicBezTo>
+                <a:cubicBezTo>
+                  <a:pt x="540000" y="1378234"/>
+                  <a:pt x="781766" y="1620000"/>
+                  <a:pt x="1080000" y="1620000"/>
+                </a:cubicBezTo>
+                <a:lnTo>
+                  <a:pt x="1172144" y="1610711"/>
+                </a:lnTo>
+                <a:lnTo>
+                  <a:pt x="1192722" y="1599542"/>
+                </a:lnTo>
+                <a:lnTo>
+                  <a:pt x="1205334" y="1595627"/>
+                </a:lnTo>
+                <a:lnTo>
+                  <a:pt x="1218649" y="1594482"/>
+                </a:lnTo>
+                <a:cubicBezTo>
+                  <a:pt x="1237851" y="1591023"/>
+                  <a:pt x="1256099" y="1586790"/>
+                  <a:pt x="1273176" y="1581875"/>
+                </a:cubicBezTo>
+                <a:lnTo>
+                  <a:pt x="1277433" y="1580379"/>
+                </a:lnTo>
+                <a:lnTo>
+                  <a:pt x="1297818" y="1578324"/>
+                </a:lnTo>
+                <a:cubicBezTo>
+                  <a:pt x="1446935" y="1578324"/>
+                  <a:pt x="1567818" y="1699207"/>
+                  <a:pt x="1567818" y="1848324"/>
+                </a:cubicBezTo>
+                <a:cubicBezTo>
+                  <a:pt x="1567818" y="1932202"/>
+                  <a:pt x="1529570" y="2007147"/>
+                  <a:pt x="1469563" y="2056669"/>
+                </a:cubicBezTo>
+                <a:lnTo>
+                  <a:pt x="1412948" y="2091019"/>
+                </a:lnTo>
+                <a:lnTo>
+                  <a:pt x="1398272" y="2101498"/>
+                </a:lnTo>
+                <a:lnTo>
+                  <a:pt x="1374464" y="2110955"/>
+                </a:lnTo>
+                <a:lnTo>
+                  <a:pt x="1376211" y="2117860"/>
+                </a:lnTo>
+                <a:lnTo>
+                  <a:pt x="1321962" y="2131809"/>
+                </a:lnTo>
+                <a:lnTo>
+                  <a:pt x="1306247" y="2138051"/>
+                </a:lnTo>
+                <a:lnTo>
+                  <a:pt x="1267530" y="2142656"/>
+                </a:lnTo>
+                <a:lnTo>
+                  <a:pt x="1190424" y="2154424"/>
+                </a:lnTo>
+                <a:cubicBezTo>
+                  <a:pt x="1154118" y="2158111"/>
+                  <a:pt x="1117280" y="2160000"/>
+                  <a:pt x="1080000" y="2160000"/>
+                </a:cubicBezTo>
+                <a:cubicBezTo>
+                  <a:pt x="483532" y="2160000"/>
+                  <a:pt x="0" y="1676468"/>
+                  <a:pt x="0" y="1080000"/>
+                </a:cubicBezTo>
+                <a:cubicBezTo>
+                  <a:pt x="0" y="483532"/>
+                  <a:pt x="483532" y="0"/>
+                  <a:pt x="1080000" y="0"/>
+                </a:cubicBezTo>
+                <a:close/>
+              </a:path>
+            </a:pathLst>
+          </a:custGeom>
+          <a:solidFill>
+            <a:srgbClr val="FF8C52"/>
+          </a:solidFill>
+          <a:ln>
+            <a:solidFill>
+              <a:srgbClr val="FF8C52"/>
+            </a:solidFill>
+          </a:ln>
+        </p:spPr>
+        <p:style>
+          <a:lnRef idx="2">
+            <a:schemeClr val="accent1">
+              <a:shade val="50000"/>
+            </a:schemeClr>
+          </a:lnRef>
+          <a:fillRef idx="1">
+            <a:schemeClr val="accent1"/>
+          </a:fillRef>
+          <a:effectRef idx="0">
+            <a:schemeClr val="accent1"/>
+          </a:effectRef>
+          <a:fontRef idx="minor">
+            <a:schemeClr val="lt1"/>
+          </a:fontRef>
+        </p:style>
+        <p:txBody>
+          <a:bodyPr rtlCol="0" anchor="ctr"/>
+          <a:lstStyle/>
+          <a:p>
+            <a:pPr algn="ctr"/>
+            <a:endParaRPr lang="en-AU" dirty="0">
+              <a:latin typeface="Oxygen" panose="02000503000000000000" pitchFamily="2" charset="0"/>
+            </a:endParaRPr>
+          </a:p>
+        </p:txBody>
+      </p:sp>
+      <p:sp>
+        <p:nvSpPr>
+          <p:cNvPr id="19" name="Rectangle 18">
+            <a:extLst>
+              <a:ext uri="{FF2B5EF4-FFF2-40B4-BE49-F238E27FC236}">
+                <a16:creationId xmlns:a16="http://schemas.microsoft.com/office/drawing/2014/main" id="{BE0EA6DA-4210-4C68-9CB8-A7373AF8DCDF}"/>
+              </a:ext>
+            </a:extLst>
+          </p:cNvPr>
+          <p:cNvSpPr/>
+          <p:nvPr/>
+        </p:nvSpPr>
+        <p:spPr>
+          <a:xfrm>
+            <a:off x="0" y="6543676"/>
+            <a:ext cx="12192000" cy="314325"/>
+          </a:xfrm>
+          <a:prstGeom prst="rect">
+            <a:avLst/>
+          </a:prstGeom>
+          <a:solidFill>
+            <a:schemeClr val="bg1">
+              <a:lumMod val="95000"/>
+            </a:schemeClr>
+          </a:solidFill>
+          <a:ln>
+            <a:noFill/>
+          </a:ln>
+        </p:spPr>
+        <p:style>
+          <a:lnRef idx="2">
+            <a:schemeClr val="accent1">
+              <a:shade val="50000"/>
+            </a:schemeClr>
+          </a:lnRef>
+          <a:fillRef idx="1">
+            <a:schemeClr val="accent1"/>
+          </a:fillRef>
+          <a:effectRef idx="0">
+            <a:schemeClr val="accent1"/>
+          </a:effectRef>
+          <a:fontRef idx="minor">
+            <a:schemeClr val="lt1"/>
+          </a:fontRef>
+        </p:style>
+        <p:txBody>
+          <a:bodyPr rtlCol="0" anchor="ctr"/>
+          <a:lstStyle/>
+          <a:p>
+            <a:r>
+              <a:rPr lang="en-US" sz="800" dirty="0">
+                <a:solidFill>
+                  <a:schemeClr val="bg1">
+                    <a:lumMod val="50000"/>
+                  </a:schemeClr>
+                </a:solidFill>
+                <a:latin typeface="Oxygen" panose="02000503000000000000" pitchFamily="2" charset="0"/>
+              </a:rPr>
+              <a:t>                                                                                                                            </a:t>
+            </a:r>
+            <a:r>
+              <a:rPr lang="en-US" sz="800" b="1" dirty="0">
+                <a:solidFill>
+                  <a:schemeClr val="bg1">
+                    <a:lumMod val="50000"/>
+                  </a:schemeClr>
+                </a:solidFill>
+                <a:latin typeface="Oxygen" panose="02000503000000000000" pitchFamily="2" charset="0"/>
+              </a:rPr>
+              <a:t> </a:t>
+            </a:r>
+            <a:r>
+              <a:rPr lang="en-US" sz="800" b="1" dirty="0">
+                <a:solidFill>
+                  <a:srgbClr val="FF8C52"/>
+                </a:solidFill>
+                <a:latin typeface="Oxygen" panose="02000503000000000000" pitchFamily="2" charset="0"/>
+              </a:rPr>
+              <a:t>CONCEPTION      &gt;&gt;      PRACTICE        &gt;&gt;        CONFIDENCE      &gt;&gt;       HIGHEST GRADES</a:t>
+            </a:r>
+            <a:r>
+              <a:rPr lang="en-US" sz="800" dirty="0">
+                <a:solidFill>
+                  <a:srgbClr val="FF8C52"/>
+                </a:solidFill>
+                <a:latin typeface="Oxygen" panose="02000503000000000000" pitchFamily="2" charset="0"/>
+              </a:rPr>
+              <a:t>                                                                             </a:t>
+            </a:r>
+            <a:r>
+              <a:rPr lang="en-US" sz="700" dirty="0">
+                <a:solidFill>
+                  <a:schemeClr val="bg1">
+                    <a:lumMod val="50000"/>
+                  </a:schemeClr>
+                </a:solidFill>
+                <a:latin typeface="Oxygen" panose="02000503000000000000" pitchFamily="2" charset="0"/>
+              </a:rPr>
+              <a:t>© </a:t>
+            </a:r>
+            <a:r>
+              <a:rPr lang="pt-BR" sz="700" dirty="0">
+                <a:solidFill>
+                  <a:schemeClr val="bg1">
+                    <a:lumMod val="50000"/>
+                  </a:schemeClr>
+                </a:solidFill>
+                <a:latin typeface="Oxygen" panose="02000503000000000000" pitchFamily="2" charset="0"/>
+              </a:rPr>
+              <a:t>PROTECTED ANODIAM 2023     ||     PRIVATE &amp; CONFIDENTIAL</a:t>
+            </a:r>
+            <a:endParaRPr lang="en-AU" sz="700" dirty="0">
+              <a:solidFill>
+                <a:schemeClr val="bg1">
+                  <a:lumMod val="50000"/>
+                </a:schemeClr>
+              </a:solidFill>
+              <a:latin typeface="Oxygen" panose="02000503000000000000" pitchFamily="2" charset="0"/>
+            </a:endParaRPr>
+          </a:p>
+        </p:txBody>
+      </p:sp>
+      <p:sp>
+        <p:nvSpPr>
+          <p:cNvPr id="20" name="Rectangle 19">
+            <a:extLst>
+              <a:ext uri="{FF2B5EF4-FFF2-40B4-BE49-F238E27FC236}">
+                <a16:creationId xmlns:a16="http://schemas.microsoft.com/office/drawing/2014/main" id="{2882E103-D333-43E6-B24E-AAE46A49364B}"/>
+              </a:ext>
+            </a:extLst>
+          </p:cNvPr>
+          <p:cNvSpPr/>
+          <p:nvPr/>
+        </p:nvSpPr>
+        <p:spPr>
+          <a:xfrm>
+            <a:off x="4270238" y="2091357"/>
+            <a:ext cx="1696780" cy="293623"/>
+          </a:xfrm>
+          <a:prstGeom prst="rect">
+            <a:avLst/>
+          </a:prstGeom>
+          <a:solidFill>
+            <a:schemeClr val="bg1">
+              <a:lumMod val="95000"/>
+            </a:schemeClr>
+          </a:solidFill>
+          <a:ln>
+            <a:noFill/>
+          </a:ln>
+        </p:spPr>
+        <p:style>
+          <a:lnRef idx="2">
+            <a:schemeClr val="accent1">
+              <a:shade val="50000"/>
+            </a:schemeClr>
+          </a:lnRef>
+          <a:fillRef idx="1">
+            <a:schemeClr val="accent1"/>
+          </a:fillRef>
+          <a:effectRef idx="0">
+            <a:schemeClr val="accent1"/>
+          </a:effectRef>
+          <a:fontRef idx="minor">
+            <a:schemeClr val="lt1"/>
+          </a:fontRef>
+        </p:style>
+        <p:txBody>
+          <a:bodyPr rtlCol="0" anchor="ctr"/>
+          <a:lstStyle/>
+          <a:p>
+            <a:r>
+              <a:rPr lang="en-AU" sz="1400" b="1" dirty="0">
+                <a:solidFill>
+                  <a:schemeClr val="bg2">
+                    <a:lumMod val="50000"/>
+                  </a:schemeClr>
+                </a:solidFill>
+                <a:latin typeface="Oxygen" panose="02000503000000000000" pitchFamily="2" charset="0"/>
+              </a:rPr>
+              <a:t>For Our Students</a:t>
+            </a:r>
+          </a:p>
+        </p:txBody>
+      </p:sp>
+      <p:sp>
+        <p:nvSpPr>
+          <p:cNvPr id="21" name="Rounded Rectangle 34">
+            <a:extLst>
+              <a:ext uri="{FF2B5EF4-FFF2-40B4-BE49-F238E27FC236}">
+                <a16:creationId xmlns:a16="http://schemas.microsoft.com/office/drawing/2014/main" id="{A598C130-1A47-46FB-A8D8-983965105574}"/>
+              </a:ext>
+            </a:extLst>
+          </p:cNvPr>
+          <p:cNvSpPr/>
+          <p:nvPr/>
+        </p:nvSpPr>
+        <p:spPr>
+          <a:xfrm>
+            <a:off x="9151645" y="1934866"/>
+            <a:ext cx="2932935" cy="3152535"/>
+          </a:xfrm>
+          <a:prstGeom prst="roundRect">
+            <a:avLst>
+              <a:gd name="adj" fmla="val 9399"/>
+            </a:avLst>
+          </a:prstGeom>
+          <a:solidFill>
+            <a:schemeClr val="bg1">
+              <a:lumMod val="95000"/>
+            </a:schemeClr>
+          </a:solidFill>
+          <a:ln>
+            <a:noFill/>
+          </a:ln>
+        </p:spPr>
+        <p:style>
+          <a:lnRef idx="2">
+            <a:schemeClr val="accent1">
+              <a:shade val="50000"/>
+            </a:schemeClr>
+          </a:lnRef>
+          <a:fillRef idx="1">
+            <a:schemeClr val="accent1"/>
+          </a:fillRef>
+          <a:effectRef idx="0">
+            <a:schemeClr val="accent1"/>
+          </a:effectRef>
+          <a:fontRef idx="minor">
+            <a:schemeClr val="lt1"/>
+          </a:fontRef>
+        </p:style>
+        <p:txBody>
+          <a:bodyPr rtlCol="0" anchor="ctr"/>
+          <a:lstStyle/>
+          <a:p>
+            <a:pPr algn="ctr"/>
+            <a:endParaRPr lang="en-AU">
+              <a:latin typeface="Oxygen" panose="02000503000000000000" pitchFamily="2" charset="0"/>
+            </a:endParaRPr>
+          </a:p>
+        </p:txBody>
+      </p:sp>
+      <p:sp>
+        <p:nvSpPr>
+          <p:cNvPr id="22" name="Rectangle 21">
+            <a:extLst>
+              <a:ext uri="{FF2B5EF4-FFF2-40B4-BE49-F238E27FC236}">
+                <a16:creationId xmlns:a16="http://schemas.microsoft.com/office/drawing/2014/main" id="{03800B09-7BE5-4A21-909F-844D4FBC6CAD}"/>
+              </a:ext>
+            </a:extLst>
+          </p:cNvPr>
+          <p:cNvSpPr/>
+          <p:nvPr/>
+        </p:nvSpPr>
+        <p:spPr>
+          <a:xfrm>
+            <a:off x="9444263" y="2148258"/>
+            <a:ext cx="2408495" cy="316231"/>
+          </a:xfrm>
+          <a:prstGeom prst="rect">
+            <a:avLst/>
+          </a:prstGeom>
+          <a:solidFill>
+            <a:schemeClr val="bg1">
+              <a:lumMod val="95000"/>
+            </a:schemeClr>
+          </a:solidFill>
+          <a:ln>
+            <a:noFill/>
+          </a:ln>
+        </p:spPr>
+        <p:style>
+          <a:lnRef idx="2">
+            <a:schemeClr val="accent1">
+              <a:shade val="50000"/>
+            </a:schemeClr>
+          </a:lnRef>
+          <a:fillRef idx="1">
+            <a:schemeClr val="accent1"/>
+          </a:fillRef>
+          <a:effectRef idx="0">
+            <a:schemeClr val="accent1"/>
+          </a:effectRef>
+          <a:fontRef idx="minor">
+            <a:schemeClr val="lt1"/>
+          </a:fontRef>
+        </p:style>
+        <p:txBody>
+          <a:bodyPr rtlCol="0" anchor="ctr"/>
+          <a:lstStyle/>
+          <a:p>
+            <a:r>
+              <a:rPr lang="en-AU" sz="1400" b="1" dirty="0">
+                <a:solidFill>
+                  <a:schemeClr val="bg2">
+                    <a:lumMod val="50000"/>
+                  </a:schemeClr>
+                </a:solidFill>
+                <a:latin typeface="Oxygen" panose="02000503000000000000" pitchFamily="2" charset="0"/>
+              </a:rPr>
+              <a:t>About the Institution</a:t>
+            </a:r>
+          </a:p>
+        </p:txBody>
+      </p:sp>
+      <p:sp>
+        <p:nvSpPr>
+          <p:cNvPr id="23" name="Rectangle 22">
+            <a:extLst>
+              <a:ext uri="{FF2B5EF4-FFF2-40B4-BE49-F238E27FC236}">
+                <a16:creationId xmlns:a16="http://schemas.microsoft.com/office/drawing/2014/main" id="{72F4671F-B215-45BC-AEBB-4FC524AAC7FF}"/>
+              </a:ext>
+            </a:extLst>
+          </p:cNvPr>
+          <p:cNvSpPr/>
+          <p:nvPr/>
+        </p:nvSpPr>
+        <p:spPr>
+          <a:xfrm>
+            <a:off x="9290483" y="2449748"/>
+            <a:ext cx="2759848" cy="2472053"/>
+          </a:xfrm>
+          <a:prstGeom prst="rect">
+            <a:avLst/>
+          </a:prstGeom>
+          <a:solidFill>
+            <a:schemeClr val="bg1">
+              <a:lumMod val="95000"/>
+            </a:schemeClr>
+          </a:solidFill>
+          <a:ln>
+            <a:noFill/>
+          </a:ln>
+        </p:spPr>
+        <p:style>
+          <a:lnRef idx="2">
+            <a:schemeClr val="accent1">
+              <a:shade val="50000"/>
+            </a:schemeClr>
+          </a:lnRef>
+          <a:fillRef idx="1">
+            <a:schemeClr val="accent1"/>
+          </a:fillRef>
+          <a:effectRef idx="0">
+            <a:schemeClr val="accent1"/>
+          </a:effectRef>
+          <a:fontRef idx="minor">
+            <a:schemeClr val="lt1"/>
+          </a:fontRef>
+        </p:style>
+        <p:txBody>
+          <a:bodyPr rtlCol="0" anchor="t"/>
+          <a:lstStyle/>
+          <a:p>
+            <a:pPr marL="285744" indent="-285744">
+              <a:lnSpc>
+                <a:spcPct val="150000"/>
+              </a:lnSpc>
+              <a:buFont typeface="Arial" panose="020B0604020202020204" pitchFamily="34" charset="0"/>
+              <a:buChar char="•"/>
+            </a:pPr>
+            <a:r>
+              <a:rPr lang="en-AU" sz="1200" dirty="0">
+                <a:solidFill>
+                  <a:schemeClr val="bg2">
+                    <a:lumMod val="50000"/>
+                  </a:schemeClr>
+                </a:solidFill>
+                <a:latin typeface="Oxygen" panose="02000503000000000000" pitchFamily="2" charset="0"/>
+              </a:rPr>
+              <a:t>ICSE/CBSE/WB VI-XII all subjects</a:t>
+            </a:r>
+          </a:p>
+          <a:p>
+            <a:pPr marL="285744" indent="-285744">
+              <a:lnSpc>
+                <a:spcPct val="150000"/>
+              </a:lnSpc>
+              <a:buFont typeface="Arial" panose="020B0604020202020204" pitchFamily="34" charset="0"/>
+              <a:buChar char="•"/>
+            </a:pPr>
+            <a:r>
+              <a:rPr lang="en-AU" sz="1200" dirty="0">
+                <a:solidFill>
+                  <a:schemeClr val="bg2">
+                    <a:lumMod val="50000"/>
+                  </a:schemeClr>
+                </a:solidFill>
+                <a:latin typeface="Oxygen" panose="02000503000000000000" pitchFamily="2" charset="0"/>
+              </a:rPr>
+              <a:t>NEET/IIT/JEE competitive exams</a:t>
+            </a:r>
+          </a:p>
+          <a:p>
+            <a:pPr marL="285744" indent="-285744">
+              <a:lnSpc>
+                <a:spcPct val="150000"/>
+              </a:lnSpc>
+              <a:buFont typeface="Arial" panose="020B0604020202020204" pitchFamily="34" charset="0"/>
+              <a:buChar char="•"/>
+            </a:pPr>
+            <a:r>
+              <a:rPr lang="en-AU" sz="1200" dirty="0">
+                <a:solidFill>
+                  <a:schemeClr val="bg2">
+                    <a:lumMod val="50000"/>
+                  </a:schemeClr>
+                </a:solidFill>
+                <a:latin typeface="Oxygen" panose="02000503000000000000" pitchFamily="2" charset="0"/>
+              </a:rPr>
+              <a:t>Great location, open 7 days</a:t>
+            </a:r>
+          </a:p>
+          <a:p>
+            <a:pPr marL="285744" indent="-285744">
+              <a:lnSpc>
+                <a:spcPct val="150000"/>
+              </a:lnSpc>
+              <a:buFont typeface="Arial" panose="020B0604020202020204" pitchFamily="34" charset="0"/>
+              <a:buChar char="•"/>
+            </a:pPr>
+            <a:r>
+              <a:rPr lang="en-AU" sz="1200" dirty="0">
+                <a:solidFill>
+                  <a:schemeClr val="bg2">
+                    <a:lumMod val="50000"/>
+                  </a:schemeClr>
+                </a:solidFill>
+                <a:latin typeface="Oxygen" panose="02000503000000000000" pitchFamily="2" charset="0"/>
+              </a:rPr>
+              <a:t>4 floors 4ksqft, 15 class rooms</a:t>
+            </a:r>
+          </a:p>
+          <a:p>
+            <a:pPr marL="285744" indent="-285744">
+              <a:lnSpc>
+                <a:spcPct val="150000"/>
+              </a:lnSpc>
+              <a:buFont typeface="Arial" panose="020B0604020202020204" pitchFamily="34" charset="0"/>
+              <a:buChar char="•"/>
+            </a:pPr>
+            <a:r>
+              <a:rPr lang="en-AU" sz="1200" dirty="0">
+                <a:solidFill>
+                  <a:schemeClr val="bg2">
+                    <a:lumMod val="50000"/>
+                  </a:schemeClr>
+                </a:solidFill>
+                <a:latin typeface="Oxygen" panose="02000503000000000000" pitchFamily="2" charset="0"/>
+              </a:rPr>
+              <a:t>Spoken English &amp; grooming</a:t>
+            </a:r>
+          </a:p>
+          <a:p>
+            <a:pPr marL="285744" indent="-285744">
+              <a:lnSpc>
+                <a:spcPct val="150000"/>
+              </a:lnSpc>
+              <a:buFont typeface="Arial" panose="020B0604020202020204" pitchFamily="34" charset="0"/>
+              <a:buChar char="•"/>
+            </a:pPr>
+            <a:r>
+              <a:rPr lang="en-AU" sz="1200" dirty="0">
+                <a:solidFill>
+                  <a:schemeClr val="bg2">
+                    <a:lumMod val="50000"/>
+                  </a:schemeClr>
+                </a:solidFill>
+                <a:latin typeface="Oxygen" panose="02000503000000000000" pitchFamily="2" charset="0"/>
+              </a:rPr>
+              <a:t>Professional counselling</a:t>
+            </a:r>
+          </a:p>
+          <a:p>
+            <a:pPr marL="285744" indent="-285744">
+              <a:lnSpc>
+                <a:spcPct val="150000"/>
+              </a:lnSpc>
+              <a:buFont typeface="Arial" panose="020B0604020202020204" pitchFamily="34" charset="0"/>
+              <a:buChar char="•"/>
+            </a:pPr>
+            <a:r>
+              <a:rPr lang="en-AU" sz="1200" dirty="0">
+                <a:solidFill>
+                  <a:schemeClr val="bg2">
+                    <a:lumMod val="50000"/>
+                  </a:schemeClr>
+                </a:solidFill>
+                <a:latin typeface="Oxygen" panose="02000503000000000000" pitchFamily="2" charset="0"/>
+              </a:rPr>
+              <a:t>Edtech app by 2023</a:t>
+            </a:r>
+          </a:p>
+          <a:p>
+            <a:pPr marL="285744" indent="-285744">
+              <a:lnSpc>
+                <a:spcPct val="150000"/>
+              </a:lnSpc>
+              <a:buFont typeface="Arial" panose="020B0604020202020204" pitchFamily="34" charset="0"/>
+              <a:buChar char="•"/>
+            </a:pPr>
+            <a:endParaRPr lang="en-AU" sz="1200" dirty="0">
+              <a:solidFill>
+                <a:schemeClr val="bg2">
+                  <a:lumMod val="50000"/>
+                </a:schemeClr>
+              </a:solidFill>
+              <a:latin typeface="Oxygen" panose="02000503000000000000" pitchFamily="2" charset="0"/>
+            </a:endParaRPr>
+          </a:p>
+          <a:p>
+            <a:pPr marL="285744" indent="-285744">
+              <a:lnSpc>
+                <a:spcPct val="150000"/>
+              </a:lnSpc>
+              <a:buFont typeface="Arial" panose="020B0604020202020204" pitchFamily="34" charset="0"/>
+              <a:buChar char="•"/>
+            </a:pPr>
+            <a:endParaRPr lang="en-AU" sz="1200" dirty="0">
+              <a:solidFill>
+                <a:schemeClr val="bg2">
+                  <a:lumMod val="50000"/>
+                </a:schemeClr>
+              </a:solidFill>
+              <a:latin typeface="Oxygen" panose="02000503000000000000" pitchFamily="2" charset="0"/>
+            </a:endParaRPr>
+          </a:p>
+        </p:txBody>
+      </p:sp>
+      <p:sp>
+        <p:nvSpPr>
+          <p:cNvPr id="24" name="TextBox 23">
+            <a:extLst>
+              <a:ext uri="{FF2B5EF4-FFF2-40B4-BE49-F238E27FC236}">
+                <a16:creationId xmlns:a16="http://schemas.microsoft.com/office/drawing/2014/main" id="{6C6FE0C4-33B3-4F61-ABFB-22CB01910074}"/>
+              </a:ext>
+            </a:extLst>
+          </p:cNvPr>
+          <p:cNvSpPr txBox="1"/>
+          <p:nvPr/>
+        </p:nvSpPr>
+        <p:spPr>
+          <a:xfrm>
+            <a:off x="4698841" y="156881"/>
+            <a:ext cx="5501827" cy="369332"/>
+          </a:xfrm>
+          <a:prstGeom prst="rect">
+            <a:avLst/>
+          </a:prstGeom>
+          <a:noFill/>
+        </p:spPr>
+        <p:txBody>
+          <a:bodyPr wrap="none" rtlCol="0">
+            <a:spAutoFit/>
+          </a:bodyPr>
+          <a:lstStyle/>
+          <a:p>
+            <a:r>
+              <a:rPr lang="en-AU" b="1" dirty="0">
+                <a:solidFill>
+                  <a:schemeClr val="bg2">
+                    <a:lumMod val="75000"/>
+                  </a:schemeClr>
+                </a:solidFill>
+                <a:latin typeface="Oxygen" panose="02000503000000000000" pitchFamily="2" charset="0"/>
+                <a:cs typeface="Arial" panose="020B0604020202020204" pitchFamily="34" charset="0"/>
+              </a:rPr>
+              <a:t>ANODIAM INSTITUTE – WELCOME OUR FACULTY</a:t>
+            </a:r>
+          </a:p>
+        </p:txBody>
+      </p:sp>
+      <p:sp>
+        <p:nvSpPr>
+          <p:cNvPr id="25" name="Rectangle 24">
+            <a:extLst>
+              <a:ext uri="{FF2B5EF4-FFF2-40B4-BE49-F238E27FC236}">
+                <a16:creationId xmlns:a16="http://schemas.microsoft.com/office/drawing/2014/main" id="{AF6F7E5C-856B-43FA-9A24-F21ECEB2DF48}"/>
+              </a:ext>
+            </a:extLst>
+          </p:cNvPr>
+          <p:cNvSpPr/>
+          <p:nvPr/>
+        </p:nvSpPr>
+        <p:spPr>
+          <a:xfrm>
+            <a:off x="4100124" y="2385357"/>
+            <a:ext cx="2370275" cy="2520420"/>
+          </a:xfrm>
+          <a:prstGeom prst="rect">
+            <a:avLst/>
+          </a:prstGeom>
+          <a:solidFill>
+            <a:schemeClr val="bg1">
+              <a:lumMod val="95000"/>
+            </a:schemeClr>
+          </a:solidFill>
+          <a:ln>
+            <a:noFill/>
+          </a:ln>
+        </p:spPr>
+        <p:style>
+          <a:lnRef idx="2">
+            <a:schemeClr val="accent1">
+              <a:shade val="50000"/>
+            </a:schemeClr>
+          </a:lnRef>
+          <a:fillRef idx="1">
+            <a:schemeClr val="accent1"/>
+          </a:fillRef>
+          <a:effectRef idx="0">
+            <a:schemeClr val="accent1"/>
+          </a:effectRef>
+          <a:fontRef idx="minor">
+            <a:schemeClr val="lt1"/>
+          </a:fontRef>
+        </p:style>
+        <p:txBody>
+          <a:bodyPr rtlCol="0" anchor="t"/>
+          <a:lstStyle/>
+          <a:p>
+            <a:pPr marL="285744" indent="-285744">
+              <a:lnSpc>
+                <a:spcPct val="150000"/>
+              </a:lnSpc>
+              <a:buFont typeface="Arial" panose="020B0604020202020204" pitchFamily="34" charset="0"/>
+              <a:buChar char="•"/>
+            </a:pPr>
+            <a:r>
+              <a:rPr lang="en-AU" sz="1200" dirty="0">
+                <a:solidFill>
+                  <a:schemeClr val="bg2">
+                    <a:lumMod val="50000"/>
+                  </a:schemeClr>
+                </a:solidFill>
+                <a:latin typeface="Oxygen" panose="02000503000000000000" pitchFamily="2" charset="0"/>
+              </a:rPr>
+              <a:t>Best teachers in town</a:t>
+            </a:r>
+          </a:p>
+          <a:p>
+            <a:pPr marL="285744" indent="-285744">
+              <a:lnSpc>
+                <a:spcPct val="150000"/>
+              </a:lnSpc>
+              <a:buFont typeface="Arial" panose="020B0604020202020204" pitchFamily="34" charset="0"/>
+              <a:buChar char="•"/>
+            </a:pPr>
+            <a:r>
+              <a:rPr lang="en-AU" sz="1200" dirty="0">
+                <a:solidFill>
+                  <a:schemeClr val="bg2">
+                    <a:lumMod val="50000"/>
+                  </a:schemeClr>
+                </a:solidFill>
+                <a:latin typeface="Oxygen" panose="02000503000000000000" pitchFamily="2" charset="0"/>
+              </a:rPr>
+              <a:t>Individual care for students</a:t>
+            </a:r>
+          </a:p>
+          <a:p>
+            <a:pPr marL="285744" indent="-285744">
+              <a:lnSpc>
+                <a:spcPct val="150000"/>
+              </a:lnSpc>
+              <a:buFont typeface="Arial" panose="020B0604020202020204" pitchFamily="34" charset="0"/>
+              <a:buChar char="•"/>
+            </a:pPr>
+            <a:r>
+              <a:rPr lang="en-AU" sz="1200" dirty="0">
+                <a:solidFill>
+                  <a:schemeClr val="bg2">
+                    <a:lumMod val="50000"/>
+                  </a:schemeClr>
+                </a:solidFill>
+                <a:latin typeface="Oxygen" panose="02000503000000000000" pitchFamily="2" charset="0"/>
+              </a:rPr>
+              <a:t>Best teaching techniques</a:t>
+            </a:r>
+          </a:p>
+          <a:p>
+            <a:pPr marL="285744" indent="-285744">
+              <a:lnSpc>
+                <a:spcPct val="150000"/>
+              </a:lnSpc>
+              <a:buFont typeface="Arial" panose="020B0604020202020204" pitchFamily="34" charset="0"/>
+              <a:buChar char="•"/>
+            </a:pPr>
+            <a:r>
+              <a:rPr lang="en-AU" sz="1200" dirty="0">
+                <a:solidFill>
+                  <a:schemeClr val="bg2">
+                    <a:lumMod val="50000"/>
+                  </a:schemeClr>
+                </a:solidFill>
+                <a:latin typeface="Oxygen" panose="02000503000000000000" pitchFamily="2" charset="0"/>
+              </a:rPr>
+              <a:t>Doubt clearing sessions</a:t>
+            </a:r>
+          </a:p>
+          <a:p>
+            <a:pPr marL="285744" indent="-285744">
+              <a:lnSpc>
+                <a:spcPct val="150000"/>
+              </a:lnSpc>
+              <a:buFont typeface="Arial" panose="020B0604020202020204" pitchFamily="34" charset="0"/>
+              <a:buChar char="•"/>
+            </a:pPr>
+            <a:r>
+              <a:rPr lang="en-AU" sz="1200" dirty="0">
+                <a:solidFill>
+                  <a:schemeClr val="bg2">
+                    <a:lumMod val="50000"/>
+                  </a:schemeClr>
+                </a:solidFill>
+                <a:latin typeface="Oxygen" panose="02000503000000000000" pitchFamily="2" charset="0"/>
+              </a:rPr>
+              <a:t>Extra makeup classes</a:t>
+            </a:r>
+          </a:p>
+          <a:p>
+            <a:pPr marL="285744" indent="-285744">
+              <a:lnSpc>
+                <a:spcPct val="150000"/>
+              </a:lnSpc>
+              <a:buFont typeface="Arial" panose="020B0604020202020204" pitchFamily="34" charset="0"/>
+              <a:buChar char="•"/>
+            </a:pPr>
+            <a:r>
+              <a:rPr lang="en-AU" sz="1200" dirty="0">
+                <a:solidFill>
+                  <a:schemeClr val="bg2">
+                    <a:lumMod val="50000"/>
+                  </a:schemeClr>
+                </a:solidFill>
+                <a:latin typeface="Oxygen" panose="02000503000000000000" pitchFamily="2" charset="0"/>
+              </a:rPr>
+              <a:t>Regular mock exams</a:t>
+            </a:r>
+          </a:p>
+          <a:p>
+            <a:pPr marL="285744" indent="-285744">
+              <a:lnSpc>
+                <a:spcPct val="150000"/>
+              </a:lnSpc>
+              <a:buFont typeface="Arial" panose="020B0604020202020204" pitchFamily="34" charset="0"/>
+              <a:buChar char="•"/>
+            </a:pPr>
+            <a:r>
+              <a:rPr lang="en-AU" sz="1200" dirty="0">
+                <a:solidFill>
+                  <a:schemeClr val="bg2">
+                    <a:lumMod val="50000"/>
+                  </a:schemeClr>
+                </a:solidFill>
+                <a:latin typeface="Oxygen" panose="02000503000000000000" pitchFamily="2" charset="0"/>
+              </a:rPr>
+              <a:t>Parent teacher meetings</a:t>
+            </a:r>
+          </a:p>
+          <a:p>
+            <a:pPr marL="285744" indent="-285744">
+              <a:lnSpc>
+                <a:spcPct val="150000"/>
+              </a:lnSpc>
+              <a:buFont typeface="Arial" panose="020B0604020202020204" pitchFamily="34" charset="0"/>
+              <a:buChar char="•"/>
+            </a:pPr>
+            <a:r>
+              <a:rPr lang="en-AU" sz="1200" dirty="0">
+                <a:solidFill>
+                  <a:schemeClr val="bg2">
+                    <a:lumMod val="50000"/>
+                  </a:schemeClr>
+                </a:solidFill>
+                <a:latin typeface="Oxygen" panose="02000503000000000000" pitchFamily="2" charset="0"/>
+              </a:rPr>
+              <a:t>All round feedback</a:t>
+            </a:r>
+          </a:p>
+          <a:p>
+            <a:pPr marL="285744" indent="-285744">
+              <a:lnSpc>
+                <a:spcPct val="150000"/>
+              </a:lnSpc>
+              <a:buFont typeface="Arial" panose="020B0604020202020204" pitchFamily="34" charset="0"/>
+              <a:buChar char="•"/>
+            </a:pPr>
+            <a:r>
+              <a:rPr lang="en-AU" sz="1200" dirty="0">
+                <a:solidFill>
+                  <a:schemeClr val="bg2">
+                    <a:lumMod val="50000"/>
+                  </a:schemeClr>
+                </a:solidFill>
+                <a:latin typeface="Oxygen" panose="02000503000000000000" pitchFamily="2" charset="0"/>
+              </a:rPr>
+              <a:t>Career counselling</a:t>
+            </a:r>
+          </a:p>
+        </p:txBody>
+      </p:sp>
+      <p:sp>
+        <p:nvSpPr>
+          <p:cNvPr id="26" name="Rounded Rectangle 33">
+            <a:extLst>
+              <a:ext uri="{FF2B5EF4-FFF2-40B4-BE49-F238E27FC236}">
+                <a16:creationId xmlns:a16="http://schemas.microsoft.com/office/drawing/2014/main" id="{95212731-6FB8-4B8C-AB56-0E687AAF68EB}"/>
+              </a:ext>
+            </a:extLst>
+          </p:cNvPr>
+          <p:cNvSpPr/>
+          <p:nvPr/>
+        </p:nvSpPr>
+        <p:spPr>
+          <a:xfrm>
+            <a:off x="6470399" y="1599415"/>
+            <a:ext cx="2790699" cy="3814568"/>
+          </a:xfrm>
+          <a:prstGeom prst="roundRect">
+            <a:avLst>
+              <a:gd name="adj" fmla="val 9399"/>
+            </a:avLst>
+          </a:prstGeom>
+          <a:solidFill>
+            <a:srgbClr val="FFF0DC"/>
+          </a:solidFill>
+          <a:ln>
+            <a:noFill/>
+          </a:ln>
+          <a:effectLst>
+            <a:glow rad="101600">
+              <a:srgbClr val="FFF0DC">
+                <a:alpha val="60000"/>
+              </a:srgbClr>
+            </a:glow>
+            <a:softEdge rad="12700"/>
+          </a:effectLst>
+        </p:spPr>
+        <p:style>
+          <a:lnRef idx="2">
+            <a:schemeClr val="accent1">
+              <a:shade val="50000"/>
+            </a:schemeClr>
+          </a:lnRef>
+          <a:fillRef idx="1">
+            <a:schemeClr val="accent1"/>
+          </a:fillRef>
+          <a:effectRef idx="0">
+            <a:schemeClr val="accent1"/>
+          </a:effectRef>
+          <a:fontRef idx="minor">
+            <a:schemeClr val="lt1"/>
+          </a:fontRef>
+        </p:style>
+        <p:txBody>
+          <a:bodyPr rtlCol="0" anchor="ctr"/>
+          <a:lstStyle/>
+          <a:p>
+            <a:pPr algn="ctr"/>
+            <a:endParaRPr lang="en-AU">
+              <a:latin typeface="Oxygen" panose="02000503000000000000" pitchFamily="2" charset="0"/>
+            </a:endParaRPr>
+          </a:p>
+        </p:txBody>
+      </p:sp>
+      <p:sp>
+        <p:nvSpPr>
+          <p:cNvPr id="27" name="Rectangle 26">
+            <a:extLst>
+              <a:ext uri="{FF2B5EF4-FFF2-40B4-BE49-F238E27FC236}">
+                <a16:creationId xmlns:a16="http://schemas.microsoft.com/office/drawing/2014/main" id="{2106610F-6EA5-4A03-8230-9B590D64D9FE}"/>
+              </a:ext>
+            </a:extLst>
+          </p:cNvPr>
+          <p:cNvSpPr/>
+          <p:nvPr/>
+        </p:nvSpPr>
+        <p:spPr>
+          <a:xfrm>
+            <a:off x="6556098" y="1776614"/>
+            <a:ext cx="2666363" cy="372463"/>
+          </a:xfrm>
+          <a:prstGeom prst="rect">
+            <a:avLst/>
+          </a:prstGeom>
+          <a:solidFill>
+            <a:srgbClr val="FFF0DC"/>
+          </a:solidFill>
+          <a:ln>
+            <a:noFill/>
+          </a:ln>
+          <a:effectLst>
+            <a:glow rad="101600">
+              <a:srgbClr val="FFF0DC">
+                <a:alpha val="60000"/>
+              </a:srgbClr>
+            </a:glow>
+          </a:effectLst>
+        </p:spPr>
+        <p:style>
+          <a:lnRef idx="2">
+            <a:schemeClr val="accent1">
+              <a:shade val="50000"/>
+            </a:schemeClr>
+          </a:lnRef>
+          <a:fillRef idx="1">
+            <a:schemeClr val="accent1"/>
+          </a:fillRef>
+          <a:effectRef idx="0">
+            <a:schemeClr val="accent1"/>
+          </a:effectRef>
+          <a:fontRef idx="minor">
+            <a:schemeClr val="lt1"/>
+          </a:fontRef>
+        </p:style>
+        <p:txBody>
+          <a:bodyPr rtlCol="0" anchor="ctr"/>
+          <a:lstStyle/>
+          <a:p>
+            <a:r>
+              <a:rPr lang="en-AU" sz="1600" b="1" dirty="0">
+                <a:solidFill>
+                  <a:schemeClr val="bg2">
+                    <a:lumMod val="50000"/>
+                  </a:schemeClr>
+                </a:solidFill>
+                <a:latin typeface="Oxygen" panose="02000503000000000000" pitchFamily="2" charset="0"/>
+              </a:rPr>
+              <a:t>For Our Faculty Members</a:t>
+            </a:r>
+          </a:p>
+        </p:txBody>
+      </p:sp>
+      <p:sp>
+        <p:nvSpPr>
+          <p:cNvPr id="28" name="Rectangle 27">
+            <a:extLst>
+              <a:ext uri="{FF2B5EF4-FFF2-40B4-BE49-F238E27FC236}">
+                <a16:creationId xmlns:a16="http://schemas.microsoft.com/office/drawing/2014/main" id="{C91BD1CE-1D41-47DE-B51A-7FB9FD715AB3}"/>
+              </a:ext>
+            </a:extLst>
+          </p:cNvPr>
+          <p:cNvSpPr/>
+          <p:nvPr/>
+        </p:nvSpPr>
+        <p:spPr>
+          <a:xfrm>
+            <a:off x="6560882" y="2162167"/>
+            <a:ext cx="2556514" cy="3049708"/>
+          </a:xfrm>
+          <a:prstGeom prst="rect">
+            <a:avLst/>
+          </a:prstGeom>
+          <a:solidFill>
+            <a:srgbClr val="FFF0DC"/>
+          </a:solidFill>
+          <a:ln>
+            <a:noFill/>
+          </a:ln>
+          <a:effectLst>
+            <a:glow rad="101600">
+              <a:srgbClr val="FFF0DC">
+                <a:alpha val="60000"/>
+              </a:srgbClr>
+            </a:glow>
+          </a:effectLst>
+        </p:spPr>
+        <p:style>
+          <a:lnRef idx="2">
+            <a:schemeClr val="accent1">
+              <a:shade val="50000"/>
+            </a:schemeClr>
+          </a:lnRef>
+          <a:fillRef idx="1">
+            <a:schemeClr val="accent1"/>
+          </a:fillRef>
+          <a:effectRef idx="0">
+            <a:schemeClr val="accent1"/>
+          </a:effectRef>
+          <a:fontRef idx="minor">
+            <a:schemeClr val="lt1"/>
+          </a:fontRef>
+        </p:style>
+        <p:txBody>
+          <a:bodyPr rtlCol="0" anchor="t"/>
+          <a:lstStyle/>
+          <a:p>
+            <a:pPr marL="285744" indent="-285744">
+              <a:lnSpc>
+                <a:spcPct val="150000"/>
+              </a:lnSpc>
+              <a:buFont typeface="Arial" panose="020B0604020202020204" pitchFamily="34" charset="0"/>
+              <a:buChar char="•"/>
+            </a:pPr>
+            <a:r>
+              <a:rPr lang="en-AU" sz="1200" dirty="0">
+                <a:solidFill>
+                  <a:schemeClr val="bg2">
+                    <a:lumMod val="50000"/>
+                  </a:schemeClr>
+                </a:solidFill>
+                <a:latin typeface="Oxygen" panose="02000503000000000000" pitchFamily="2" charset="0"/>
+              </a:rPr>
+              <a:t>Most rewarding package</a:t>
+            </a:r>
+          </a:p>
+          <a:p>
+            <a:pPr marL="285744" indent="-285744">
+              <a:lnSpc>
+                <a:spcPct val="150000"/>
+              </a:lnSpc>
+              <a:buFont typeface="Arial" panose="020B0604020202020204" pitchFamily="34" charset="0"/>
+              <a:buChar char="•"/>
+            </a:pPr>
+            <a:r>
+              <a:rPr lang="en-AU" sz="1200" dirty="0">
+                <a:solidFill>
+                  <a:schemeClr val="bg2">
+                    <a:lumMod val="50000"/>
+                  </a:schemeClr>
+                </a:solidFill>
+                <a:latin typeface="Oxygen" panose="02000503000000000000" pitchFamily="2" charset="0"/>
+              </a:rPr>
+              <a:t>Astronomical growth</a:t>
+            </a:r>
+          </a:p>
+          <a:p>
+            <a:pPr marL="285744" indent="-285744">
+              <a:lnSpc>
+                <a:spcPct val="150000"/>
+              </a:lnSpc>
+              <a:buFont typeface="Arial" panose="020B0604020202020204" pitchFamily="34" charset="0"/>
+              <a:buChar char="•"/>
+            </a:pPr>
+            <a:r>
+              <a:rPr lang="en-AU" sz="1200" dirty="0">
+                <a:solidFill>
+                  <a:schemeClr val="bg2">
+                    <a:lumMod val="50000"/>
+                  </a:schemeClr>
+                </a:solidFill>
+                <a:latin typeface="Oxygen" panose="02000503000000000000" pitchFamily="2" charset="0"/>
+              </a:rPr>
+              <a:t>Best talents in the field</a:t>
+            </a:r>
+          </a:p>
+          <a:p>
+            <a:pPr marL="285744" indent="-285744">
+              <a:lnSpc>
+                <a:spcPct val="150000"/>
+              </a:lnSpc>
+              <a:buFont typeface="Arial" panose="020B0604020202020204" pitchFamily="34" charset="0"/>
+              <a:buChar char="•"/>
+            </a:pPr>
+            <a:r>
+              <a:rPr lang="en-AU" sz="1200" dirty="0">
+                <a:solidFill>
+                  <a:schemeClr val="bg2">
+                    <a:lumMod val="50000"/>
+                  </a:schemeClr>
+                </a:solidFill>
+                <a:latin typeface="Oxygen" panose="02000503000000000000" pitchFamily="2" charset="0"/>
+              </a:rPr>
+              <a:t>Teamwork &amp; synergy</a:t>
+            </a:r>
+          </a:p>
+          <a:p>
+            <a:pPr marL="285744" indent="-285744">
+              <a:lnSpc>
+                <a:spcPct val="150000"/>
+              </a:lnSpc>
+              <a:buFont typeface="Arial" panose="020B0604020202020204" pitchFamily="34" charset="0"/>
+              <a:buChar char="•"/>
+            </a:pPr>
+            <a:r>
+              <a:rPr lang="en-AU" sz="1200" dirty="0">
+                <a:solidFill>
+                  <a:schemeClr val="bg2">
+                    <a:lumMod val="50000"/>
+                  </a:schemeClr>
+                </a:solidFill>
+                <a:latin typeface="Oxygen" panose="02000503000000000000" pitchFamily="2" charset="0"/>
+              </a:rPr>
+              <a:t>Professional &amp; compassionate</a:t>
+            </a:r>
+          </a:p>
+          <a:p>
+            <a:pPr marL="285744" indent="-285744">
+              <a:lnSpc>
+                <a:spcPct val="150000"/>
+              </a:lnSpc>
+              <a:buFont typeface="Arial" panose="020B0604020202020204" pitchFamily="34" charset="0"/>
+              <a:buChar char="•"/>
+            </a:pPr>
+            <a:r>
+              <a:rPr lang="en-AU" sz="1200" dirty="0">
+                <a:solidFill>
+                  <a:schemeClr val="bg2">
+                    <a:lumMod val="50000"/>
+                  </a:schemeClr>
+                </a:solidFill>
+                <a:latin typeface="Oxygen" panose="02000503000000000000" pitchFamily="2" charset="0"/>
+              </a:rPr>
+              <a:t>Gratifying environment</a:t>
+            </a:r>
+          </a:p>
+          <a:p>
+            <a:pPr marL="285744" indent="-285744">
+              <a:lnSpc>
+                <a:spcPct val="150000"/>
+              </a:lnSpc>
+              <a:buFont typeface="Arial" panose="020B0604020202020204" pitchFamily="34" charset="0"/>
+              <a:buChar char="•"/>
+            </a:pPr>
+            <a:r>
+              <a:rPr lang="en-AU" sz="1200" dirty="0">
+                <a:solidFill>
+                  <a:schemeClr val="bg2">
+                    <a:lumMod val="50000"/>
+                  </a:schemeClr>
+                </a:solidFill>
+                <a:latin typeface="Oxygen" panose="02000503000000000000" pitchFamily="2" charset="0"/>
+              </a:rPr>
+              <a:t>Effective marketing support</a:t>
+            </a:r>
+          </a:p>
+          <a:p>
+            <a:pPr marL="285744" indent="-285744">
+              <a:lnSpc>
+                <a:spcPct val="150000"/>
+              </a:lnSpc>
+              <a:buFont typeface="Arial" panose="020B0604020202020204" pitchFamily="34" charset="0"/>
+              <a:buChar char="•"/>
+            </a:pPr>
+            <a:r>
+              <a:rPr lang="en-AU" sz="1200" dirty="0">
+                <a:solidFill>
+                  <a:schemeClr val="bg2">
+                    <a:lumMod val="50000"/>
+                  </a:schemeClr>
+                </a:solidFill>
+                <a:latin typeface="Oxygen" panose="02000503000000000000" pitchFamily="2" charset="0"/>
+              </a:rPr>
+              <a:t>Proficient management</a:t>
+            </a:r>
+          </a:p>
+          <a:p>
+            <a:pPr marL="285744" indent="-285744">
+              <a:lnSpc>
+                <a:spcPct val="150000"/>
+              </a:lnSpc>
+              <a:buFont typeface="Arial" panose="020B0604020202020204" pitchFamily="34" charset="0"/>
+              <a:buChar char="•"/>
+            </a:pPr>
+            <a:r>
+              <a:rPr lang="en-AU" sz="1200" dirty="0">
+                <a:solidFill>
+                  <a:schemeClr val="bg2">
+                    <a:lumMod val="50000"/>
+                  </a:schemeClr>
+                </a:solidFill>
+                <a:latin typeface="Oxygen" panose="02000503000000000000" pitchFamily="2" charset="0"/>
+              </a:rPr>
+              <a:t>Feature rich app support</a:t>
+            </a:r>
+          </a:p>
+        </p:txBody>
+      </p:sp>
+      <p:pic>
+        <p:nvPicPr>
+          <p:cNvPr id="29" name="Picture 2" descr="Premium Vector | Happy family characters activity caring dad teaching son  to ride bike for the first time father teach kid boy cycling outdoor  parenting fatherhood concept cartoon people vector illustration">
+            <a:extLst>
+              <a:ext uri="{FF2B5EF4-FFF2-40B4-BE49-F238E27FC236}">
+                <a16:creationId xmlns:a16="http://schemas.microsoft.com/office/drawing/2014/main" id="{3C3BAFC8-7842-4E2F-87C4-52C71F21820F}"/>
+              </a:ext>
+            </a:extLst>
+          </p:cNvPr>
+          <p:cNvPicPr>
+            <a:picLocks noChangeAspect="1" noChangeArrowheads="1"/>
+          </p:cNvPicPr>
+          <p:nvPr/>
+        </p:nvPicPr>
+        <p:blipFill>
+          <a:blip r:embed="rId3">
+            <a:extLst>
+              <a:ext uri="{28A0092B-C50C-407E-A947-70E740481C1C}">
+                <a14:useLocalDpi xmlns:a14="http://schemas.microsoft.com/office/drawing/2010/main" val="0"/>
+              </a:ext>
+            </a:extLst>
+          </a:blip>
+          <a:srcRect/>
+          <a:stretch>
+            <a:fillRect/>
+          </a:stretch>
+        </p:blipFill>
+        <p:spPr bwMode="auto">
+          <a:xfrm>
+            <a:off x="179947" y="2355964"/>
+            <a:ext cx="3222872" cy="2908461"/>
+          </a:xfrm>
+          <a:prstGeom prst="rect">
+            <a:avLst/>
+          </a:prstGeom>
+          <a:noFill/>
+          <a:extLst>
+            <a:ext uri="{909E8E84-426E-40DD-AFC4-6F175D3DCCD1}">
+              <a14:hiddenFill xmlns:a14="http://schemas.microsoft.com/office/drawing/2010/main">
+                <a:solidFill>
+                  <a:srgbClr val="FFFFFF"/>
+                </a:solidFill>
+              </a14:hiddenFill>
+            </a:ext>
+          </a:extLst>
+        </p:spPr>
+      </p:pic>
+      <p:sp>
+        <p:nvSpPr>
+          <p:cNvPr id="30" name="Rectangle 29">
+            <a:extLst>
+              <a:ext uri="{FF2B5EF4-FFF2-40B4-BE49-F238E27FC236}">
+                <a16:creationId xmlns:a16="http://schemas.microsoft.com/office/drawing/2014/main" id="{B1BF8D3B-1CB4-4A3F-8935-DCAB5D63EA5E}"/>
+              </a:ext>
+            </a:extLst>
+          </p:cNvPr>
+          <p:cNvSpPr/>
+          <p:nvPr/>
+        </p:nvSpPr>
+        <p:spPr>
+          <a:xfrm>
+            <a:off x="417268" y="2408253"/>
+            <a:ext cx="2702823" cy="2702825"/>
+          </a:xfrm>
+          <a:prstGeom prst="rect">
+            <a:avLst/>
+          </a:prstGeom>
+          <a:gradFill flip="none" rotWithShape="1">
+            <a:gsLst>
+              <a:gs pos="0">
+                <a:srgbClr val="FFFFFF">
+                  <a:alpha val="0"/>
+                </a:srgbClr>
+              </a:gs>
+              <a:gs pos="62000">
+                <a:srgbClr val="FFFFFF">
+                  <a:alpha val="0"/>
+                </a:srgbClr>
+              </a:gs>
+              <a:gs pos="72000">
+                <a:schemeClr val="bg1"/>
+              </a:gs>
+              <a:gs pos="100000">
+                <a:schemeClr val="bg1"/>
+              </a:gs>
+            </a:gsLst>
+            <a:path path="circle">
+              <a:fillToRect l="50000" t="50000" r="50000" b="50000"/>
+            </a:path>
+            <a:tileRect/>
+          </a:gradFill>
+          <a:ln>
+            <a:noFill/>
+          </a:ln>
+        </p:spPr>
+        <p:style>
+          <a:lnRef idx="2">
+            <a:schemeClr val="accent1">
+              <a:shade val="50000"/>
+            </a:schemeClr>
+          </a:lnRef>
+          <a:fillRef idx="1">
+            <a:schemeClr val="accent1"/>
+          </a:fillRef>
+          <a:effectRef idx="0">
+            <a:schemeClr val="accent1"/>
+          </a:effectRef>
+          <a:fontRef idx="minor">
+            <a:schemeClr val="lt1"/>
+          </a:fontRef>
+        </p:style>
+        <p:txBody>
+          <a:bodyPr rtlCol="0" anchor="ctr"/>
+          <a:lstStyle/>
+          <a:p>
+            <a:pPr algn="ctr"/>
+            <a:endParaRPr lang="en-AU">
+              <a:latin typeface="Oxygen" panose="02000503000000000000" pitchFamily="2" charset="0"/>
+            </a:endParaRPr>
+          </a:p>
+        </p:txBody>
+      </p:sp>
+    </p:spTree>
+    <p:extLst>
+      <p:ext uri="{BB962C8B-B14F-4D97-AF65-F5344CB8AC3E}">
+        <p14:creationId xmlns:p14="http://schemas.microsoft.com/office/powerpoint/2010/main" val="2656682204"/>
+      </p:ext>
+    </p:extLst>
+  </p:cSld>
+  <p:clrMapOvr>
+    <a:masterClrMapping/>
+  </p:clrMapOvr>
+</p:sld>
+</file>
+
+<file path=ppt/slides/slide2.xml><?xml version="1.0" encoding="utf-8"?>
 <p:sld xmlns:a="http://schemas.openxmlformats.org/drawingml/2006/main" xmlns:r="http://schemas.openxmlformats.org/officeDocument/2006/relationships" xmlns:p="http://schemas.openxmlformats.org/presentationml/2006/main">
   <p:cSld>
     <p:spTree>
@@ -6105,7 +8066,7 @@
     </p:spTree>
     <p:extLst>
       <p:ext uri="{BB962C8B-B14F-4D97-AF65-F5344CB8AC3E}">
-        <p14:creationId xmlns:p14="http://schemas.microsoft.com/office/powerpoint/2010/main" val="2656682204"/>
+        <p14:creationId xmlns:p14="http://schemas.microsoft.com/office/powerpoint/2010/main" val="2866470120"/>
       </p:ext>
     </p:extLst>
   </p:cSld>
@@ -6115,7 +8076,7 @@
 </p:sld>
 </file>
 
-<file path=ppt/slides/slide2.xml><?xml version="1.0" encoding="utf-8"?>
+<file path=ppt/slides/slide3.xml><?xml version="1.0" encoding="utf-8"?>
 <p:sld xmlns:a="http://schemas.openxmlformats.org/drawingml/2006/main" xmlns:r="http://schemas.openxmlformats.org/officeDocument/2006/relationships" xmlns:p="http://schemas.openxmlformats.org/presentationml/2006/main">
   <p:cSld>
     <p:spTree>
@@ -6179,64 +8140,6 @@
           </a:extLst>
         </p:spPr>
       </p:pic>
-      <p:sp>
-        <p:nvSpPr>
-          <p:cNvPr id="4" name="Rounded Rectangle 32">
-            <a:extLst>
-              <a:ext uri="{FF2B5EF4-FFF2-40B4-BE49-F238E27FC236}">
-                <a16:creationId xmlns:a16="http://schemas.microsoft.com/office/drawing/2014/main" id="{DDB5EBE6-DC83-4C22-A245-44C7445E9AF2}"/>
-              </a:ext>
-            </a:extLst>
-          </p:cNvPr>
-          <p:cNvSpPr/>
-          <p:nvPr/>
-        </p:nvSpPr>
-        <p:spPr>
-          <a:xfrm>
-            <a:off x="4818418" y="921839"/>
-            <a:ext cx="2932935" cy="2697029"/>
-          </a:xfrm>
-          <a:prstGeom prst="roundRect">
-            <a:avLst>
-              <a:gd name="adj" fmla="val 9399"/>
-            </a:avLst>
-          </a:prstGeom>
-          <a:solidFill>
-            <a:schemeClr val="bg1">
-              <a:lumMod val="95000"/>
-            </a:schemeClr>
-          </a:solidFill>
-          <a:ln>
-            <a:noFill/>
-          </a:ln>
-        </p:spPr>
-        <p:style>
-          <a:lnRef idx="2">
-            <a:schemeClr val="accent1">
-              <a:shade val="50000"/>
-            </a:schemeClr>
-          </a:lnRef>
-          <a:fillRef idx="1">
-            <a:schemeClr val="accent1"/>
-          </a:fillRef>
-          <a:effectRef idx="0">
-            <a:schemeClr val="accent1"/>
-          </a:effectRef>
-          <a:fontRef idx="minor">
-            <a:schemeClr val="lt1"/>
-          </a:fontRef>
-        </p:style>
-        <p:txBody>
-          <a:bodyPr rtlCol="0" anchor="ctr"/>
-          <a:lstStyle/>
-          <a:p>
-            <a:pPr algn="ctr"/>
-            <a:endParaRPr lang="en-AU">
-              <a:latin typeface="Oxygen" panose="02000503000000000000" pitchFamily="2" charset="0"/>
-            </a:endParaRPr>
-          </a:p>
-        </p:txBody>
-      </p:sp>
       <p:sp>
         <p:nvSpPr>
           <p:cNvPr id="5" name="Rectangle 4">
@@ -6915,69 +8818,6 @@
       </p:sp>
       <p:sp>
         <p:nvSpPr>
-          <p:cNvPr id="20" name="Rectangle 19">
-            <a:extLst>
-              <a:ext uri="{FF2B5EF4-FFF2-40B4-BE49-F238E27FC236}">
-                <a16:creationId xmlns:a16="http://schemas.microsoft.com/office/drawing/2014/main" id="{2882E103-D333-43E6-B24E-AAE46A49364B}"/>
-              </a:ext>
-            </a:extLst>
-          </p:cNvPr>
-          <p:cNvSpPr/>
-          <p:nvPr/>
-        </p:nvSpPr>
-        <p:spPr>
-          <a:xfrm>
-            <a:off x="5055430" y="1087698"/>
-            <a:ext cx="1696780" cy="293623"/>
-          </a:xfrm>
-          <a:prstGeom prst="rect">
-            <a:avLst/>
-          </a:prstGeom>
-          <a:solidFill>
-            <a:schemeClr val="bg1">
-              <a:lumMod val="95000"/>
-            </a:schemeClr>
-          </a:solidFill>
-          <a:ln>
-            <a:noFill/>
-          </a:ln>
-        </p:spPr>
-        <p:style>
-          <a:lnRef idx="2">
-            <a:schemeClr val="accent1">
-              <a:shade val="50000"/>
-            </a:schemeClr>
-          </a:lnRef>
-          <a:fillRef idx="1">
-            <a:schemeClr val="accent1"/>
-          </a:fillRef>
-          <a:effectRef idx="0">
-            <a:schemeClr val="accent1"/>
-          </a:effectRef>
-          <a:fontRef idx="minor">
-            <a:schemeClr val="lt1"/>
-          </a:fontRef>
-        </p:style>
-        <p:txBody>
-          <a:bodyPr rtlCol="0" anchor="ctr"/>
-          <a:lstStyle/>
-          <a:p>
-            <a:r>
-              <a:rPr lang="en-AU" sz="1400" b="1" dirty="0">
-                <a:solidFill>
-                  <a:schemeClr val="bg2">
-                    <a:lumMod val="50000"/>
-                  </a:schemeClr>
-                </a:solidFill>
-                <a:latin typeface="Oxygen" panose="02000503000000000000" pitchFamily="2" charset="0"/>
-              </a:rPr>
-              <a:t>Whom We Need?</a:t>
-            </a:r>
-          </a:p>
-        </p:txBody>
-      </p:sp>
-      <p:sp>
-        <p:nvSpPr>
           <p:cNvPr id="24" name="TextBox 23">
             <a:extLst>
               <a:ext uri="{FF2B5EF4-FFF2-40B4-BE49-F238E27FC236}">
@@ -7015,196 +8855,6 @@
                 <a:cs typeface="Arial" panose="020B0604020202020204" pitchFamily="34" charset="0"/>
               </a:rPr>
               <a:t>FACULTY MEMBERS REQUIRED</a:t>
-            </a:r>
-          </a:p>
-        </p:txBody>
-      </p:sp>
-      <p:sp>
-        <p:nvSpPr>
-          <p:cNvPr id="25" name="Rectangle 24">
-            <a:extLst>
-              <a:ext uri="{FF2B5EF4-FFF2-40B4-BE49-F238E27FC236}">
-                <a16:creationId xmlns:a16="http://schemas.microsoft.com/office/drawing/2014/main" id="{AF6F7E5C-856B-43FA-9A24-F21ECEB2DF48}"/>
-              </a:ext>
-            </a:extLst>
-          </p:cNvPr>
-          <p:cNvSpPr/>
-          <p:nvPr/>
-        </p:nvSpPr>
-        <p:spPr>
-          <a:xfrm>
-            <a:off x="4839015" y="1381698"/>
-            <a:ext cx="2556513" cy="2087664"/>
-          </a:xfrm>
-          <a:prstGeom prst="rect">
-            <a:avLst/>
-          </a:prstGeom>
-          <a:solidFill>
-            <a:schemeClr val="bg1">
-              <a:lumMod val="95000"/>
-            </a:schemeClr>
-          </a:solidFill>
-          <a:ln>
-            <a:noFill/>
-          </a:ln>
-        </p:spPr>
-        <p:style>
-          <a:lnRef idx="2">
-            <a:schemeClr val="accent1">
-              <a:shade val="50000"/>
-            </a:schemeClr>
-          </a:lnRef>
-          <a:fillRef idx="1">
-            <a:schemeClr val="accent1"/>
-          </a:fillRef>
-          <a:effectRef idx="0">
-            <a:schemeClr val="accent1"/>
-          </a:effectRef>
-          <a:fontRef idx="minor">
-            <a:schemeClr val="lt1"/>
-          </a:fontRef>
-        </p:style>
-        <p:txBody>
-          <a:bodyPr rtlCol="0" anchor="t"/>
-          <a:lstStyle/>
-          <a:p>
-            <a:pPr marL="285744" indent="-285744">
-              <a:lnSpc>
-                <a:spcPct val="150000"/>
-              </a:lnSpc>
-              <a:buFont typeface="Arial" panose="020B0604020202020204" pitchFamily="34" charset="0"/>
-              <a:buChar char="•"/>
-            </a:pPr>
-            <a:r>
-              <a:rPr lang="en-AU" sz="1200" dirty="0">
-                <a:solidFill>
-                  <a:schemeClr val="bg2">
-                    <a:lumMod val="50000"/>
-                  </a:schemeClr>
-                </a:solidFill>
-                <a:latin typeface="Oxygen" panose="02000503000000000000" pitchFamily="2" charset="0"/>
-              </a:rPr>
-              <a:t>Empathetic &amp; inspiring</a:t>
-            </a:r>
-          </a:p>
-          <a:p>
-            <a:pPr marL="285744" indent="-285744">
-              <a:lnSpc>
-                <a:spcPct val="150000"/>
-              </a:lnSpc>
-              <a:buFont typeface="Arial" panose="020B0604020202020204" pitchFamily="34" charset="0"/>
-              <a:buChar char="•"/>
-            </a:pPr>
-            <a:r>
-              <a:rPr lang="en-AU" sz="1200" dirty="0">
-                <a:solidFill>
-                  <a:schemeClr val="bg2">
-                    <a:lumMod val="50000"/>
-                  </a:schemeClr>
-                </a:solidFill>
-                <a:latin typeface="Oxygen" panose="02000503000000000000" pitchFamily="2" charset="0"/>
-              </a:rPr>
-              <a:t>Adaptable &amp; innovative</a:t>
-            </a:r>
-          </a:p>
-          <a:p>
-            <a:pPr marL="285744" indent="-285744">
-              <a:lnSpc>
-                <a:spcPct val="150000"/>
-              </a:lnSpc>
-              <a:buFont typeface="Arial" panose="020B0604020202020204" pitchFamily="34" charset="0"/>
-              <a:buChar char="•"/>
-            </a:pPr>
-            <a:r>
-              <a:rPr lang="en-AU" sz="1200" dirty="0">
-                <a:solidFill>
-                  <a:schemeClr val="bg2">
-                    <a:lumMod val="50000"/>
-                  </a:schemeClr>
-                </a:solidFill>
-                <a:latin typeface="Oxygen" panose="02000503000000000000" pitchFamily="2" charset="0"/>
-              </a:rPr>
-              <a:t>Confident &amp; pleasing</a:t>
-            </a:r>
-          </a:p>
-          <a:p>
-            <a:pPr marL="285744" indent="-285744">
-              <a:lnSpc>
-                <a:spcPct val="150000"/>
-              </a:lnSpc>
-              <a:buFont typeface="Arial" panose="020B0604020202020204" pitchFamily="34" charset="0"/>
-              <a:buChar char="•"/>
-            </a:pPr>
-            <a:r>
-              <a:rPr lang="en-AU" sz="1200" dirty="0">
-                <a:solidFill>
-                  <a:schemeClr val="bg2">
-                    <a:lumMod val="50000"/>
-                  </a:schemeClr>
-                </a:solidFill>
-                <a:latin typeface="Oxygen" panose="02000503000000000000" pitchFamily="2" charset="0"/>
-              </a:rPr>
-              <a:t>In-depth subject knowledge</a:t>
-            </a:r>
-          </a:p>
-          <a:p>
-            <a:pPr marL="285744" indent="-285744">
-              <a:lnSpc>
-                <a:spcPct val="150000"/>
-              </a:lnSpc>
-              <a:buFont typeface="Arial" panose="020B0604020202020204" pitchFamily="34" charset="0"/>
-              <a:buChar char="•"/>
-            </a:pPr>
-            <a:r>
-              <a:rPr lang="en-AU" sz="1200" dirty="0">
-                <a:solidFill>
-                  <a:schemeClr val="bg2">
-                    <a:lumMod val="50000"/>
-                  </a:schemeClr>
-                </a:solidFill>
-                <a:latin typeface="Oxygen" panose="02000503000000000000" pitchFamily="2" charset="0"/>
-              </a:rPr>
-              <a:t>Aware of exam patterns</a:t>
-            </a:r>
-          </a:p>
-          <a:p>
-            <a:pPr marL="285744" indent="-285744">
-              <a:lnSpc>
-                <a:spcPct val="150000"/>
-              </a:lnSpc>
-              <a:buFont typeface="Arial" panose="020B0604020202020204" pitchFamily="34" charset="0"/>
-              <a:buChar char="•"/>
-            </a:pPr>
-            <a:r>
-              <a:rPr lang="en-AU" sz="1200" dirty="0">
-                <a:solidFill>
-                  <a:schemeClr val="bg2">
-                    <a:lumMod val="50000"/>
-                  </a:schemeClr>
-                </a:solidFill>
-                <a:latin typeface="Oxygen" panose="02000503000000000000" pitchFamily="2" charset="0"/>
-              </a:rPr>
-              <a:t>Experience in teaching</a:t>
-            </a:r>
-          </a:p>
-          <a:p>
-            <a:pPr marL="285744" indent="-285744">
-              <a:lnSpc>
-                <a:spcPct val="150000"/>
-              </a:lnSpc>
-              <a:buFont typeface="Arial" panose="020B0604020202020204" pitchFamily="34" charset="0"/>
-              <a:buChar char="•"/>
-            </a:pPr>
-            <a:r>
-              <a:rPr lang="en-AU" sz="1200" dirty="0">
-                <a:solidFill>
-                  <a:schemeClr val="bg2">
-                    <a:lumMod val="50000"/>
-                  </a:schemeClr>
-                </a:solidFill>
-                <a:latin typeface="Oxygen" panose="02000503000000000000" pitchFamily="2" charset="0"/>
-              </a:rPr>
-              <a:t>V-blogging is an add on</a:t>
             </a:r>
           </a:p>
         </p:txBody>
@@ -7286,6 +8936,317 @@
       </p:sp>
       <p:sp>
         <p:nvSpPr>
+          <p:cNvPr id="4" name="Rounded Rectangle 32">
+            <a:extLst>
+              <a:ext uri="{FF2B5EF4-FFF2-40B4-BE49-F238E27FC236}">
+                <a16:creationId xmlns:a16="http://schemas.microsoft.com/office/drawing/2014/main" id="{DDB5EBE6-DC83-4C22-A245-44C7445E9AF2}"/>
+              </a:ext>
+            </a:extLst>
+          </p:cNvPr>
+          <p:cNvSpPr/>
+          <p:nvPr/>
+        </p:nvSpPr>
+        <p:spPr>
+          <a:xfrm>
+            <a:off x="4818418" y="921839"/>
+            <a:ext cx="2932935" cy="2697029"/>
+          </a:xfrm>
+          <a:prstGeom prst="roundRect">
+            <a:avLst>
+              <a:gd name="adj" fmla="val 9399"/>
+            </a:avLst>
+          </a:prstGeom>
+          <a:solidFill>
+            <a:schemeClr val="bg1">
+              <a:lumMod val="95000"/>
+            </a:schemeClr>
+          </a:solidFill>
+          <a:ln>
+            <a:noFill/>
+          </a:ln>
+        </p:spPr>
+        <p:style>
+          <a:lnRef idx="2">
+            <a:schemeClr val="accent1">
+              <a:shade val="50000"/>
+            </a:schemeClr>
+          </a:lnRef>
+          <a:fillRef idx="1">
+            <a:schemeClr val="accent1"/>
+          </a:fillRef>
+          <a:effectRef idx="0">
+            <a:schemeClr val="accent1"/>
+          </a:effectRef>
+          <a:fontRef idx="minor">
+            <a:schemeClr val="lt1"/>
+          </a:fontRef>
+        </p:style>
+        <p:txBody>
+          <a:bodyPr rtlCol="0" anchor="ctr"/>
+          <a:lstStyle/>
+          <a:p>
+            <a:pPr algn="ctr"/>
+            <a:endParaRPr lang="en-AU">
+              <a:latin typeface="Oxygen" panose="02000503000000000000" pitchFamily="2" charset="0"/>
+            </a:endParaRPr>
+          </a:p>
+        </p:txBody>
+      </p:sp>
+      <p:sp>
+        <p:nvSpPr>
+          <p:cNvPr id="20" name="Rectangle 19">
+            <a:extLst>
+              <a:ext uri="{FF2B5EF4-FFF2-40B4-BE49-F238E27FC236}">
+                <a16:creationId xmlns:a16="http://schemas.microsoft.com/office/drawing/2014/main" id="{2882E103-D333-43E6-B24E-AAE46A49364B}"/>
+              </a:ext>
+            </a:extLst>
+          </p:cNvPr>
+          <p:cNvSpPr/>
+          <p:nvPr/>
+        </p:nvSpPr>
+        <p:spPr>
+          <a:xfrm>
+            <a:off x="5055430" y="1087698"/>
+            <a:ext cx="1696780" cy="293623"/>
+          </a:xfrm>
+          <a:prstGeom prst="rect">
+            <a:avLst/>
+          </a:prstGeom>
+          <a:solidFill>
+            <a:schemeClr val="bg1">
+              <a:lumMod val="95000"/>
+            </a:schemeClr>
+          </a:solidFill>
+          <a:ln>
+            <a:noFill/>
+          </a:ln>
+        </p:spPr>
+        <p:style>
+          <a:lnRef idx="2">
+            <a:schemeClr val="accent1">
+              <a:shade val="50000"/>
+            </a:schemeClr>
+          </a:lnRef>
+          <a:fillRef idx="1">
+            <a:schemeClr val="accent1"/>
+          </a:fillRef>
+          <a:effectRef idx="0">
+            <a:schemeClr val="accent1"/>
+          </a:effectRef>
+          <a:fontRef idx="minor">
+            <a:schemeClr val="lt1"/>
+          </a:fontRef>
+        </p:style>
+        <p:txBody>
+          <a:bodyPr rtlCol="0" anchor="ctr"/>
+          <a:lstStyle/>
+          <a:p>
+            <a:r>
+              <a:rPr lang="en-AU" sz="1400" b="1" dirty="0">
+                <a:solidFill>
+                  <a:schemeClr val="bg2">
+                    <a:lumMod val="50000"/>
+                  </a:schemeClr>
+                </a:solidFill>
+                <a:latin typeface="Oxygen" panose="02000503000000000000" pitchFamily="2" charset="0"/>
+              </a:rPr>
+              <a:t>Whom We Need?</a:t>
+            </a:r>
+          </a:p>
+        </p:txBody>
+      </p:sp>
+      <p:sp>
+        <p:nvSpPr>
+          <p:cNvPr id="25" name="Rectangle 24">
+            <a:extLst>
+              <a:ext uri="{FF2B5EF4-FFF2-40B4-BE49-F238E27FC236}">
+                <a16:creationId xmlns:a16="http://schemas.microsoft.com/office/drawing/2014/main" id="{AF6F7E5C-856B-43FA-9A24-F21ECEB2DF48}"/>
+              </a:ext>
+            </a:extLst>
+          </p:cNvPr>
+          <p:cNvSpPr/>
+          <p:nvPr/>
+        </p:nvSpPr>
+        <p:spPr>
+          <a:xfrm>
+            <a:off x="4839015" y="1381698"/>
+            <a:ext cx="2556513" cy="2087664"/>
+          </a:xfrm>
+          <a:prstGeom prst="rect">
+            <a:avLst/>
+          </a:prstGeom>
+          <a:solidFill>
+            <a:schemeClr val="bg1">
+              <a:lumMod val="95000"/>
+            </a:schemeClr>
+          </a:solidFill>
+          <a:ln>
+            <a:noFill/>
+          </a:ln>
+        </p:spPr>
+        <p:style>
+          <a:lnRef idx="2">
+            <a:schemeClr val="accent1">
+              <a:shade val="50000"/>
+            </a:schemeClr>
+          </a:lnRef>
+          <a:fillRef idx="1">
+            <a:schemeClr val="accent1"/>
+          </a:fillRef>
+          <a:effectRef idx="0">
+            <a:schemeClr val="accent1"/>
+          </a:effectRef>
+          <a:fontRef idx="minor">
+            <a:schemeClr val="lt1"/>
+          </a:fontRef>
+        </p:style>
+        <p:txBody>
+          <a:bodyPr rtlCol="0" anchor="t"/>
+          <a:lstStyle/>
+          <a:p>
+            <a:pPr marL="285744" indent="-285744">
+              <a:lnSpc>
+                <a:spcPct val="150000"/>
+              </a:lnSpc>
+              <a:buFont typeface="Arial" panose="020B0604020202020204" pitchFamily="34" charset="0"/>
+              <a:buChar char="•"/>
+            </a:pPr>
+            <a:r>
+              <a:rPr lang="en-AU" sz="1200" dirty="0">
+                <a:solidFill>
+                  <a:schemeClr val="bg2">
+                    <a:lumMod val="50000"/>
+                  </a:schemeClr>
+                </a:solidFill>
+                <a:latin typeface="Oxygen" panose="02000503000000000000" pitchFamily="2" charset="0"/>
+              </a:rPr>
+              <a:t>Empathetic &amp; inspiring</a:t>
+            </a:r>
+          </a:p>
+          <a:p>
+            <a:pPr marL="285744" indent="-285744">
+              <a:lnSpc>
+                <a:spcPct val="150000"/>
+              </a:lnSpc>
+              <a:buFont typeface="Arial" panose="020B0604020202020204" pitchFamily="34" charset="0"/>
+              <a:buChar char="•"/>
+            </a:pPr>
+            <a:r>
+              <a:rPr lang="en-AU" sz="1200" dirty="0">
+                <a:solidFill>
+                  <a:schemeClr val="bg2">
+                    <a:lumMod val="50000"/>
+                  </a:schemeClr>
+                </a:solidFill>
+                <a:latin typeface="Oxygen" panose="02000503000000000000" pitchFamily="2" charset="0"/>
+              </a:rPr>
+              <a:t>Adaptable &amp; innovative</a:t>
+            </a:r>
+          </a:p>
+          <a:p>
+            <a:pPr marL="285744" indent="-285744">
+              <a:lnSpc>
+                <a:spcPct val="150000"/>
+              </a:lnSpc>
+              <a:buFont typeface="Arial" panose="020B0604020202020204" pitchFamily="34" charset="0"/>
+              <a:buChar char="•"/>
+            </a:pPr>
+            <a:r>
+              <a:rPr lang="en-AU" sz="1200" dirty="0">
+                <a:solidFill>
+                  <a:schemeClr val="bg2">
+                    <a:lumMod val="50000"/>
+                  </a:schemeClr>
+                </a:solidFill>
+                <a:latin typeface="Oxygen" panose="02000503000000000000" pitchFamily="2" charset="0"/>
+              </a:rPr>
+              <a:t>Confident &amp; pleasing</a:t>
+            </a:r>
+          </a:p>
+          <a:p>
+            <a:pPr marL="285744" indent="-285744">
+              <a:lnSpc>
+                <a:spcPct val="150000"/>
+              </a:lnSpc>
+              <a:buFont typeface="Arial" panose="020B0604020202020204" pitchFamily="34" charset="0"/>
+              <a:buChar char="•"/>
+            </a:pPr>
+            <a:r>
+              <a:rPr lang="en-AU" sz="1200" dirty="0">
+                <a:solidFill>
+                  <a:schemeClr val="bg2">
+                    <a:lumMod val="50000"/>
+                  </a:schemeClr>
+                </a:solidFill>
+                <a:latin typeface="Oxygen" panose="02000503000000000000" pitchFamily="2" charset="0"/>
+              </a:rPr>
+              <a:t>In-depth subject knowledge</a:t>
+            </a:r>
+          </a:p>
+          <a:p>
+            <a:pPr marL="285744" indent="-285744">
+              <a:lnSpc>
+                <a:spcPct val="150000"/>
+              </a:lnSpc>
+              <a:buFont typeface="Arial" panose="020B0604020202020204" pitchFamily="34" charset="0"/>
+              <a:buChar char="•"/>
+            </a:pPr>
+            <a:r>
+              <a:rPr lang="en-AU" sz="1200" dirty="0">
+                <a:solidFill>
+                  <a:schemeClr val="bg2">
+                    <a:lumMod val="50000"/>
+                  </a:schemeClr>
+                </a:solidFill>
+                <a:latin typeface="Oxygen" panose="02000503000000000000" pitchFamily="2" charset="0"/>
+              </a:rPr>
+              <a:t>Aware of exam patterns</a:t>
+            </a:r>
+          </a:p>
+          <a:p>
+            <a:pPr marL="285744" indent="-285744">
+              <a:lnSpc>
+                <a:spcPct val="150000"/>
+              </a:lnSpc>
+              <a:buFont typeface="Arial" panose="020B0604020202020204" pitchFamily="34" charset="0"/>
+              <a:buChar char="•"/>
+            </a:pPr>
+            <a:r>
+              <a:rPr lang="en-AU" sz="1200" dirty="0">
+                <a:solidFill>
+                  <a:schemeClr val="bg2">
+                    <a:lumMod val="50000"/>
+                  </a:schemeClr>
+                </a:solidFill>
+                <a:latin typeface="Oxygen" panose="02000503000000000000" pitchFamily="2" charset="0"/>
+              </a:rPr>
+              <a:t>Experience in teaching</a:t>
+            </a:r>
+          </a:p>
+          <a:p>
+            <a:pPr marL="285744" indent="-285744">
+              <a:lnSpc>
+                <a:spcPct val="150000"/>
+              </a:lnSpc>
+              <a:buFont typeface="Arial" panose="020B0604020202020204" pitchFamily="34" charset="0"/>
+              <a:buChar char="•"/>
+            </a:pPr>
+            <a:r>
+              <a:rPr lang="en-AU" sz="1200" dirty="0">
+                <a:solidFill>
+                  <a:schemeClr val="bg2">
+                    <a:lumMod val="50000"/>
+                  </a:schemeClr>
+                </a:solidFill>
+                <a:latin typeface="Oxygen" panose="02000503000000000000" pitchFamily="2" charset="0"/>
+              </a:rPr>
+              <a:t>V-blogging is an add on</a:t>
+            </a:r>
+          </a:p>
+        </p:txBody>
+      </p:sp>
+      <p:sp>
+        <p:nvSpPr>
           <p:cNvPr id="29" name="Rounded Rectangle 32">
             <a:extLst>
               <a:ext uri="{FF2B5EF4-FFF2-40B4-BE49-F238E27FC236}">
@@ -7402,7 +9363,7 @@
                 </a:solidFill>
                 <a:latin typeface="Oxygen" panose="02000503000000000000" pitchFamily="2" charset="0"/>
               </a:rPr>
-              <a:t>You Are Expected To…</a:t>
+              <a:t>You Are Expected To ...</a:t>
             </a:r>
           </a:p>
         </p:txBody>
@@ -7612,7 +9573,7 @@
         </p:nvSpPr>
         <p:spPr>
           <a:xfrm>
-            <a:off x="4984077" y="3453011"/>
+            <a:off x="4983353" y="3451021"/>
             <a:ext cx="2932935" cy="2768885"/>
           </a:xfrm>
           <a:prstGeom prst="roundRect">
@@ -7859,7 +9820,7 @@
               <a:buChar char="•"/>
             </a:pPr>
             <a:r>
-              <a:rPr lang="en-AU" sz="1200">
+              <a:rPr lang="en-AU" sz="1200" dirty="0">
                 <a:solidFill>
                   <a:schemeClr val="bg2">
                     <a:lumMod val="50000"/>
@@ -7879,7 +9840,7 @@
               <a:buChar char="•"/>
             </a:pPr>
             <a:r>
-              <a:rPr lang="en-AU" sz="1200">
+              <a:rPr lang="en-AU" sz="1200" dirty="0">
                 <a:solidFill>
                   <a:schemeClr val="bg2">
                     <a:lumMod val="50000"/>
@@ -7887,18 +9848,7 @@
                 </a:solidFill>
                 <a:latin typeface="Oxygen" panose="02000503000000000000" pitchFamily="2" charset="0"/>
               </a:rPr>
-              <a:t>Dedicated </a:t>
-            </a:r>
-            <a:r>
-              <a:rPr lang="en-AU" sz="1200" dirty="0">
-                <a:solidFill>
-                  <a:schemeClr val="bg2">
-                    <a:lumMod val="50000"/>
-                  </a:schemeClr>
-                </a:solidFill>
-                <a:latin typeface="Oxygen" panose="02000503000000000000" pitchFamily="2" charset="0"/>
-              </a:rPr>
-              <a:t>multilevel building</a:t>
+              <a:t>Dedicated multilevel building</a:t>
             </a:r>
           </a:p>
           <a:p>
@@ -7937,7 +9887,7 @@
         </p:nvSpPr>
         <p:spPr>
           <a:xfrm>
-            <a:off x="7853162" y="3678287"/>
+            <a:off x="7853162" y="3679062"/>
             <a:ext cx="2932935" cy="2697029"/>
           </a:xfrm>
           <a:prstGeom prst="roundRect">
@@ -7995,7 +9945,7 @@
         </p:nvSpPr>
         <p:spPr>
           <a:xfrm>
-            <a:off x="8090174" y="3844146"/>
+            <a:off x="8090174" y="3844921"/>
             <a:ext cx="2218668" cy="293998"/>
           </a:xfrm>
           <a:prstGeom prst="rect">
@@ -8039,7 +9989,7 @@
                 </a:solidFill>
                 <a:latin typeface="Oxygen" panose="02000503000000000000" pitchFamily="2" charset="0"/>
               </a:rPr>
-              <a:t>What You Can Expect…</a:t>
+              <a:t>What You Can Expect ...</a:t>
             </a:r>
           </a:p>
         </p:txBody>
@@ -8058,7 +10008,7 @@
         </p:nvSpPr>
         <p:spPr>
           <a:xfrm>
-            <a:off x="7873759" y="4138146"/>
+            <a:off x="7873759" y="4138921"/>
             <a:ext cx="2912338" cy="2087664"/>
           </a:xfrm>
           <a:prstGeom prst="rect">

</xml_diff>